<commit_message>
Add notes to slide 64 on walking students through the hierarchy
</commit_message>
<xml_diff>
--- a/curriculum/Unit6/Unit6.pptx
+++ b/curriculum/Unit6/Unit6.pptx
@@ -16110,7 +16110,7 @@
             <a:spLocks noGrp="1"/>
           </p:cNvSpPr>
           <p:nvPr>
-            <p:ph type="sldNum" sz="quarter" idx="10"/>
+            <p:ph type="sldNum" sz="quarter" idx="5"/>
           </p:nvPr>
         </p:nvSpPr>
         <p:spPr/>
@@ -16118,9 +16118,9 @@
           <a:bodyPr/>
           <a:lstStyle/>
           <a:p>
-            <a:fld id="{C56969A0-B3EA-45A4-A390-44554200A62E}" type="slidenum">
+            <a:fld id="{A7ECB63E-8074-41A1-9CD7-8EC3ED69F85F}" type="slidenum">
               <a:rPr lang="en-US" smtClean="0"/>
-              <a:t>67</a:t>
+              <a:t>63</a:t>
             </a:fld>
             <a:endParaRPr lang="en-US"/>
           </a:p>
@@ -16129,7 +16129,7 @@
     </p:spTree>
     <p:extLst>
       <p:ext uri="{BB962C8B-B14F-4D97-AF65-F5344CB8AC3E}">
-        <p14:creationId xmlns:p14="http://schemas.microsoft.com/office/powerpoint/2010/main" val="2386918127"/>
+        <p14:creationId xmlns:p14="http://schemas.microsoft.com/office/powerpoint/2010/main" val="2875358068"/>
       </p:ext>
     </p:extLst>
   </p:cSld>
@@ -16183,6 +16183,175 @@
           <a:bodyPr/>
           <a:lstStyle/>
           <a:p>
+            <a:pPr marL="0" marR="0" lvl="0" indent="0" algn="l" defTabSz="914400" rtl="0" eaLnBrk="1" fontAlgn="auto" latinLnBrk="0" hangingPunct="1">
+              <a:lnSpc>
+                <a:spcPct val="100000"/>
+              </a:lnSpc>
+              <a:spcBef>
+                <a:spcPts val="0"/>
+              </a:spcBef>
+              <a:spcAft>
+                <a:spcPts val="0"/>
+              </a:spcAft>
+              <a:buClrTx/>
+              <a:buSzTx/>
+              <a:buFontTx/>
+              <a:buNone/>
+              <a:tabLst/>
+              <a:defRPr/>
+            </a:pPr>
+            <a:r>
+              <a:rPr lang="en-US" dirty="0" err="1">
+                <a:latin typeface="Courier New" panose="02070309020205020404" pitchFamily="49" charset="0"/>
+                <a:cs typeface="Courier New" panose="02070309020205020404" pitchFamily="49" charset="0"/>
+              </a:rPr>
+              <a:t>Useing</a:t>
+            </a:r>
+            <a:r>
+              <a:rPr lang="en-US" dirty="0">
+                <a:latin typeface="Courier New" panose="02070309020205020404" pitchFamily="49" charset="0"/>
+                <a:cs typeface="Courier New" panose="02070309020205020404" pitchFamily="49" charset="0"/>
+              </a:rPr>
+              <a:t> the Step 1 hierarchy graph and the Step 2 Output table:</a:t>
+            </a:r>
+          </a:p>
+          <a:p>
+            <a:r>
+              <a:rPr lang="en-US" dirty="0"/>
+              <a:t>      Walk through each Musical Instrument printed through the loop.  </a:t>
+            </a:r>
+          </a:p>
+          <a:p>
+            <a:r>
+              <a:rPr lang="en-US"/>
+              <a:t>      Have </a:t>
+            </a:r>
+            <a:r>
+              <a:rPr lang="en-US" dirty="0"/>
+              <a:t>students explain how each statement produced the given out in the 3 loop lines:</a:t>
+            </a:r>
+          </a:p>
+          <a:p>
+            <a:pPr marL="0" indent="0">
+              <a:buNone/>
+            </a:pPr>
+            <a:r>
+              <a:rPr lang="en-US" dirty="0">
+                <a:latin typeface="Courier New" panose="02070309020205020404" pitchFamily="49" charset="0"/>
+                <a:cs typeface="Courier New" panose="02070309020205020404" pitchFamily="49" charset="0"/>
+              </a:rPr>
+              <a:t>	</a:t>
+            </a:r>
+            <a:r>
+              <a:rPr lang="en-US" dirty="0" err="1">
+                <a:latin typeface="Courier New" panose="02070309020205020404" pitchFamily="49" charset="0"/>
+                <a:cs typeface="Courier New" panose="02070309020205020404" pitchFamily="49" charset="0"/>
+              </a:rPr>
+              <a:t>System.out.println</a:t>
+            </a:r>
+            <a:r>
+              <a:rPr lang="en-US" dirty="0">
+                <a:latin typeface="Courier New" panose="02070309020205020404" pitchFamily="49" charset="0"/>
+                <a:cs typeface="Courier New" panose="02070309020205020404" pitchFamily="49" charset="0"/>
+              </a:rPr>
+              <a:t>(</a:t>
+            </a:r>
+            <a:r>
+              <a:rPr lang="en-US" dirty="0" err="1">
+                <a:latin typeface="Courier New" panose="02070309020205020404" pitchFamily="49" charset="0"/>
+                <a:cs typeface="Courier New" panose="02070309020205020404" pitchFamily="49" charset="0"/>
+              </a:rPr>
+              <a:t>insts</a:t>
+            </a:r>
+            <a:r>
+              <a:rPr lang="en-US" dirty="0">
+                <a:latin typeface="Courier New" panose="02070309020205020404" pitchFamily="49" charset="0"/>
+                <a:cs typeface="Courier New" panose="02070309020205020404" pitchFamily="49" charset="0"/>
+              </a:rPr>
+              <a:t>[i]);</a:t>
+            </a:r>
+          </a:p>
+          <a:p>
+            <a:pPr marL="0" indent="0">
+              <a:buNone/>
+            </a:pPr>
+            <a:r>
+              <a:rPr lang="en-US" dirty="0">
+                <a:latin typeface="Courier New" panose="02070309020205020404" pitchFamily="49" charset="0"/>
+                <a:cs typeface="Courier New" panose="02070309020205020404" pitchFamily="49" charset="0"/>
+              </a:rPr>
+              <a:t>    	</a:t>
+            </a:r>
+            <a:r>
+              <a:rPr lang="en-US" dirty="0" err="1">
+                <a:latin typeface="Courier New" panose="02070309020205020404" pitchFamily="49" charset="0"/>
+                <a:cs typeface="Courier New" panose="02070309020205020404" pitchFamily="49" charset="0"/>
+              </a:rPr>
+              <a:t>insts</a:t>
+            </a:r>
+            <a:r>
+              <a:rPr lang="en-US" dirty="0">
+                <a:latin typeface="Courier New" panose="02070309020205020404" pitchFamily="49" charset="0"/>
+                <a:cs typeface="Courier New" panose="02070309020205020404" pitchFamily="49" charset="0"/>
+              </a:rPr>
+              <a:t> [i].</a:t>
+            </a:r>
+            <a:r>
+              <a:rPr lang="en-US" dirty="0" err="1">
+                <a:latin typeface="Courier New" panose="02070309020205020404" pitchFamily="49" charset="0"/>
+                <a:cs typeface="Courier New" panose="02070309020205020404" pitchFamily="49" charset="0"/>
+              </a:rPr>
+              <a:t>pickSound</a:t>
+            </a:r>
+            <a:r>
+              <a:rPr lang="en-US" dirty="0">
+                <a:latin typeface="Courier New" panose="02070309020205020404" pitchFamily="49" charset="0"/>
+                <a:cs typeface="Courier New" panose="02070309020205020404" pitchFamily="49" charset="0"/>
+              </a:rPr>
+              <a:t>();</a:t>
+            </a:r>
+          </a:p>
+          <a:p>
+            <a:pPr marL="0" indent="0">
+              <a:buNone/>
+            </a:pPr>
+            <a:r>
+              <a:rPr lang="en-US" dirty="0">
+                <a:latin typeface="Courier New" panose="02070309020205020404" pitchFamily="49" charset="0"/>
+                <a:cs typeface="Courier New" panose="02070309020205020404" pitchFamily="49" charset="0"/>
+              </a:rPr>
+              <a:t>    	</a:t>
+            </a:r>
+            <a:r>
+              <a:rPr lang="en-US" dirty="0" err="1">
+                <a:latin typeface="Courier New" panose="02070309020205020404" pitchFamily="49" charset="0"/>
+                <a:cs typeface="Courier New" panose="02070309020205020404" pitchFamily="49" charset="0"/>
+              </a:rPr>
+              <a:t>insts</a:t>
+            </a:r>
+            <a:r>
+              <a:rPr lang="en-US" dirty="0">
+                <a:latin typeface="Courier New" panose="02070309020205020404" pitchFamily="49" charset="0"/>
+                <a:cs typeface="Courier New" panose="02070309020205020404" pitchFamily="49" charset="0"/>
+              </a:rPr>
+              <a:t> [i].</a:t>
+            </a:r>
+            <a:r>
+              <a:rPr lang="en-US" dirty="0" err="1">
+                <a:latin typeface="Courier New" panose="02070309020205020404" pitchFamily="49" charset="0"/>
+                <a:cs typeface="Courier New" panose="02070309020205020404" pitchFamily="49" charset="0"/>
+              </a:rPr>
+              <a:t>playNote</a:t>
+            </a:r>
+            <a:r>
+              <a:rPr lang="en-US" dirty="0">
+                <a:latin typeface="Courier New" panose="02070309020205020404" pitchFamily="49" charset="0"/>
+                <a:cs typeface="Courier New" panose="02070309020205020404" pitchFamily="49" charset="0"/>
+              </a:rPr>
+              <a:t>();</a:t>
+            </a:r>
+          </a:p>
+          <a:p>
             <a:endParaRPr lang="en-US" dirty="0"/>
           </a:p>
         </p:txBody>
@@ -16204,7 +16373,7 @@
           <a:p>
             <a:fld id="{C56969A0-B3EA-45A4-A390-44554200A62E}" type="slidenum">
               <a:rPr lang="en-US" smtClean="0"/>
-              <a:t>75</a:t>
+              <a:t>64</a:t>
             </a:fld>
             <a:endParaRPr lang="en-US"/>
           </a:p>
@@ -16213,7 +16382,7 @@
     </p:spTree>
     <p:extLst>
       <p:ext uri="{BB962C8B-B14F-4D97-AF65-F5344CB8AC3E}">
-        <p14:creationId xmlns:p14="http://schemas.microsoft.com/office/powerpoint/2010/main" val="5538721"/>
+        <p14:creationId xmlns:p14="http://schemas.microsoft.com/office/powerpoint/2010/main" val="2422966477"/>
       </p:ext>
     </p:extLst>
   </p:cSld>
@@ -16288,7 +16457,7 @@
           <a:p>
             <a:fld id="{C56969A0-B3EA-45A4-A390-44554200A62E}" type="slidenum">
               <a:rPr lang="en-US" smtClean="0"/>
-              <a:t>83</a:t>
+              <a:t>67</a:t>
             </a:fld>
             <a:endParaRPr lang="en-US"/>
           </a:p>
@@ -16297,7 +16466,7 @@
     </p:spTree>
     <p:extLst>
       <p:ext uri="{BB962C8B-B14F-4D97-AF65-F5344CB8AC3E}">
-        <p14:creationId xmlns:p14="http://schemas.microsoft.com/office/powerpoint/2010/main" val="1965811128"/>
+        <p14:creationId xmlns:p14="http://schemas.microsoft.com/office/powerpoint/2010/main" val="2386918127"/>
       </p:ext>
     </p:extLst>
   </p:cSld>
@@ -16351,18 +16520,6 @@
           <a:bodyPr/>
           <a:lstStyle/>
           <a:p>
-            <a:r>
-              <a:rPr lang="en-US" dirty="0"/>
-              <a:t>This</a:t>
-            </a:r>
-            <a:r>
-              <a:rPr lang="en-US" baseline="0" dirty="0"/>
-              <a:t> unit is mostly done either on practice it or the board. Feel free to edit </a:t>
-            </a:r>
-            <a:r>
-              <a:rPr lang="en-US" baseline="0"/>
-              <a:t>this slide deck as you see fit!</a:t>
-            </a:r>
             <a:endParaRPr lang="en-US" dirty="0"/>
           </a:p>
         </p:txBody>
@@ -16384,6 +16541,186 @@
           <a:p>
             <a:fld id="{C56969A0-B3EA-45A4-A390-44554200A62E}" type="slidenum">
               <a:rPr lang="en-US" smtClean="0"/>
+              <a:t>75</a:t>
+            </a:fld>
+            <a:endParaRPr lang="en-US"/>
+          </a:p>
+        </p:txBody>
+      </p:sp>
+    </p:spTree>
+    <p:extLst>
+      <p:ext uri="{BB962C8B-B14F-4D97-AF65-F5344CB8AC3E}">
+        <p14:creationId xmlns:p14="http://schemas.microsoft.com/office/powerpoint/2010/main" val="5538721"/>
+      </p:ext>
+    </p:extLst>
+  </p:cSld>
+  <p:clrMapOvr>
+    <a:masterClrMapping/>
+  </p:clrMapOvr>
+</p:notes>
+</file>
+
+<file path=ppt/notesSlides/notesSlide14.xml><?xml version="1.0" encoding="utf-8"?>
+<p:notes xmlns:a="http://schemas.openxmlformats.org/drawingml/2006/main" xmlns:r="http://schemas.openxmlformats.org/officeDocument/2006/relationships" xmlns:p="http://schemas.openxmlformats.org/presentationml/2006/main">
+  <p:cSld>
+    <p:spTree>
+      <p:nvGrpSpPr>
+        <p:cNvPr id="1" name=""/>
+        <p:cNvGrpSpPr/>
+        <p:nvPr/>
+      </p:nvGrpSpPr>
+      <p:grpSpPr>
+        <a:xfrm>
+          <a:off x="0" y="0"/>
+          <a:ext cx="0" cy="0"/>
+          <a:chOff x="0" y="0"/>
+          <a:chExt cx="0" cy="0"/>
+        </a:xfrm>
+      </p:grpSpPr>
+      <p:sp>
+        <p:nvSpPr>
+          <p:cNvPr id="2" name="Slide Image Placeholder 1"/>
+          <p:cNvSpPr>
+            <a:spLocks noGrp="1" noRot="1" noChangeAspect="1"/>
+          </p:cNvSpPr>
+          <p:nvPr>
+            <p:ph type="sldImg"/>
+          </p:nvPr>
+        </p:nvSpPr>
+        <p:spPr/>
+      </p:sp>
+      <p:sp>
+        <p:nvSpPr>
+          <p:cNvPr id="3" name="Notes Placeholder 2"/>
+          <p:cNvSpPr>
+            <a:spLocks noGrp="1"/>
+          </p:cNvSpPr>
+          <p:nvPr>
+            <p:ph type="body" idx="1"/>
+          </p:nvPr>
+        </p:nvSpPr>
+        <p:spPr/>
+        <p:txBody>
+          <a:bodyPr/>
+          <a:lstStyle/>
+          <a:p>
+            <a:endParaRPr lang="en-US" dirty="0"/>
+          </a:p>
+        </p:txBody>
+      </p:sp>
+      <p:sp>
+        <p:nvSpPr>
+          <p:cNvPr id="4" name="Slide Number Placeholder 3"/>
+          <p:cNvSpPr>
+            <a:spLocks noGrp="1"/>
+          </p:cNvSpPr>
+          <p:nvPr>
+            <p:ph type="sldNum" sz="quarter" idx="10"/>
+          </p:nvPr>
+        </p:nvSpPr>
+        <p:spPr/>
+        <p:txBody>
+          <a:bodyPr/>
+          <a:lstStyle/>
+          <a:p>
+            <a:fld id="{C56969A0-B3EA-45A4-A390-44554200A62E}" type="slidenum">
+              <a:rPr lang="en-US" smtClean="0"/>
+              <a:t>83</a:t>
+            </a:fld>
+            <a:endParaRPr lang="en-US"/>
+          </a:p>
+        </p:txBody>
+      </p:sp>
+    </p:spTree>
+    <p:extLst>
+      <p:ext uri="{BB962C8B-B14F-4D97-AF65-F5344CB8AC3E}">
+        <p14:creationId xmlns:p14="http://schemas.microsoft.com/office/powerpoint/2010/main" val="1965811128"/>
+      </p:ext>
+    </p:extLst>
+  </p:cSld>
+  <p:clrMapOvr>
+    <a:masterClrMapping/>
+  </p:clrMapOvr>
+</p:notes>
+</file>
+
+<file path=ppt/notesSlides/notesSlide15.xml><?xml version="1.0" encoding="utf-8"?>
+<p:notes xmlns:a="http://schemas.openxmlformats.org/drawingml/2006/main" xmlns:r="http://schemas.openxmlformats.org/officeDocument/2006/relationships" xmlns:p="http://schemas.openxmlformats.org/presentationml/2006/main">
+  <p:cSld>
+    <p:spTree>
+      <p:nvGrpSpPr>
+        <p:cNvPr id="1" name=""/>
+        <p:cNvGrpSpPr/>
+        <p:nvPr/>
+      </p:nvGrpSpPr>
+      <p:grpSpPr>
+        <a:xfrm>
+          <a:off x="0" y="0"/>
+          <a:ext cx="0" cy="0"/>
+          <a:chOff x="0" y="0"/>
+          <a:chExt cx="0" cy="0"/>
+        </a:xfrm>
+      </p:grpSpPr>
+      <p:sp>
+        <p:nvSpPr>
+          <p:cNvPr id="2" name="Slide Image Placeholder 1"/>
+          <p:cNvSpPr>
+            <a:spLocks noGrp="1" noRot="1" noChangeAspect="1"/>
+          </p:cNvSpPr>
+          <p:nvPr>
+            <p:ph type="sldImg"/>
+          </p:nvPr>
+        </p:nvSpPr>
+        <p:spPr/>
+      </p:sp>
+      <p:sp>
+        <p:nvSpPr>
+          <p:cNvPr id="3" name="Notes Placeholder 2"/>
+          <p:cNvSpPr>
+            <a:spLocks noGrp="1"/>
+          </p:cNvSpPr>
+          <p:nvPr>
+            <p:ph type="body" idx="1"/>
+          </p:nvPr>
+        </p:nvSpPr>
+        <p:spPr/>
+        <p:txBody>
+          <a:bodyPr/>
+          <a:lstStyle/>
+          <a:p>
+            <a:r>
+              <a:rPr lang="en-US" dirty="0"/>
+              <a:t>This</a:t>
+            </a:r>
+            <a:r>
+              <a:rPr lang="en-US" baseline="0" dirty="0"/>
+              <a:t> unit is mostly done either on practice it or the board. Feel free to edit </a:t>
+            </a:r>
+            <a:r>
+              <a:rPr lang="en-US" baseline="0"/>
+              <a:t>this slide deck as you see fit!</a:t>
+            </a:r>
+            <a:endParaRPr lang="en-US" dirty="0"/>
+          </a:p>
+        </p:txBody>
+      </p:sp>
+      <p:sp>
+        <p:nvSpPr>
+          <p:cNvPr id="4" name="Slide Number Placeholder 3"/>
+          <p:cNvSpPr>
+            <a:spLocks noGrp="1"/>
+          </p:cNvSpPr>
+          <p:nvPr>
+            <p:ph type="sldNum" sz="quarter" idx="10"/>
+          </p:nvPr>
+        </p:nvSpPr>
+        <p:spPr/>
+        <p:txBody>
+          <a:bodyPr/>
+          <a:lstStyle/>
+          <a:p>
+            <a:fld id="{C56969A0-B3EA-45A4-A390-44554200A62E}" type="slidenum">
+              <a:rPr lang="en-US" smtClean="0"/>
               <a:t>85</a:t>
             </a:fld>
             <a:endParaRPr lang="en-US"/>
@@ -16403,7 +16740,7 @@
 </p:notes>
 </file>
 
-<file path=ppt/notesSlides/notesSlide14.xml><?xml version="1.0" encoding="utf-8"?>
+<file path=ppt/notesSlides/notesSlide16.xml><?xml version="1.0" encoding="utf-8"?>
 <p:notes xmlns:a="http://schemas.openxmlformats.org/drawingml/2006/main" xmlns:r="http://schemas.openxmlformats.org/officeDocument/2006/relationships" xmlns:p="http://schemas.openxmlformats.org/presentationml/2006/main">
   <p:cSld>
     <p:spTree>
@@ -17171,7 +17508,7 @@
             <a:spLocks noGrp="1"/>
           </p:cNvSpPr>
           <p:nvPr>
-            <p:ph type="sldNum" sz="quarter" idx="10"/>
+            <p:ph type="sldNum" sz="quarter" idx="5"/>
           </p:nvPr>
         </p:nvSpPr>
         <p:spPr/>
@@ -17179,9 +17516,9 @@
           <a:bodyPr/>
           <a:lstStyle/>
           <a:p>
-            <a:fld id="{C56969A0-B3EA-45A4-A390-44554200A62E}" type="slidenum">
+            <a:fld id="{A7ECB63E-8074-41A1-9CD7-8EC3ED69F85F}" type="slidenum">
               <a:rPr lang="en-US" smtClean="0"/>
-              <a:t>64</a:t>
+              <a:t>60</a:t>
             </a:fld>
             <a:endParaRPr lang="en-US"/>
           </a:p>
@@ -17190,7 +17527,7 @@
     </p:spTree>
     <p:extLst>
       <p:ext uri="{BB962C8B-B14F-4D97-AF65-F5344CB8AC3E}">
-        <p14:creationId xmlns:p14="http://schemas.microsoft.com/office/powerpoint/2010/main" val="2422966477"/>
+        <p14:creationId xmlns:p14="http://schemas.microsoft.com/office/powerpoint/2010/main" val="659790653"/>
       </p:ext>
     </p:extLst>
   </p:cSld>
@@ -29938,7 +30275,7 @@
             <a:effectLst/>
             <a:extLst>
               <a:ext uri="{C572A759-6A51-4108-AA02-DFA0A04FC94B}">
-                <ma14:wrappingTextBoxFlag xmlns="" xmlns:wpc="http://schemas.microsoft.com/office/word/2010/wordprocessingCanvas" xmlns:mo="http://schemas.microsoft.com/office/mac/office/2008/main" xmlns:mc="http://schemas.openxmlformats.org/markup-compatibility/2006" xmlns:mv="urn:schemas-microsoft-com:mac:vml" xmlns:o="urn:schemas-microsoft-com:office:office" xmlns:m="http://schemas.openxmlformats.org/officeDocument/2006/math" xmlns:v="urn:schemas-microsoft-com:vml" xmlns:wp14="http://schemas.microsoft.com/office/word/2010/wordprocessingDrawing" xmlns:wp="http://schemas.openxmlformats.org/drawingml/2006/wordprocessingDrawing" xmlns:w10="urn:schemas-microsoft-com:office:word" xmlns:w="http://schemas.openxmlformats.org/wordprocessingml/2006/main" xmlns:w14="http://schemas.microsoft.com/office/word/2010/wordml" xmlns:wpg="http://schemas.microsoft.com/office/word/2010/wordprocessingGroup" xmlns:wpi="http://schemas.microsoft.com/office/word/2010/wordprocessingInk" xmlns:wne="http://schemas.microsoft.com/office/word/2006/wordml" xmlns:wps="http://schemas.microsoft.com/office/word/2010/wordprocessingShape" xmlns:ma14="http://schemas.microsoft.com/office/mac/drawingml/2011/main" xmlns:lc="http://schemas.openxmlformats.org/drawingml/2006/lockedCanvas"/>
+                <ma14:wrappingTextBoxFlag xmlns:lc="http://schemas.openxmlformats.org/drawingml/2006/lockedCanvas" xmlns:ma14="http://schemas.microsoft.com/office/mac/drawingml/2011/main" xmlns:wps="http://schemas.microsoft.com/office/word/2010/wordprocessingShape" xmlns:wne="http://schemas.microsoft.com/office/word/2006/wordml" xmlns:wpi="http://schemas.microsoft.com/office/word/2010/wordprocessingInk" xmlns:wpg="http://schemas.microsoft.com/office/word/2010/wordprocessingGroup" xmlns:w14="http://schemas.microsoft.com/office/word/2010/wordml" xmlns:w="http://schemas.openxmlformats.org/wordprocessingml/2006/main" xmlns:w10="urn:schemas-microsoft-com:office:word" xmlns:wp="http://schemas.openxmlformats.org/drawingml/2006/wordprocessingDrawing" xmlns:wp14="http://schemas.microsoft.com/office/word/2010/wordprocessingDrawing" xmlns:v="urn:schemas-microsoft-com:vml" xmlns:m="http://schemas.openxmlformats.org/officeDocument/2006/math" xmlns:o="urn:schemas-microsoft-com:office:office" xmlns:mv="urn:schemas-microsoft-com:mac:vml" xmlns:mc="http://schemas.openxmlformats.org/markup-compatibility/2006" xmlns:mo="http://schemas.microsoft.com/office/mac/office/2008/main" xmlns:wpc="http://schemas.microsoft.com/office/word/2010/wordprocessingCanvas" xmlns=""/>
               </a:ext>
             </a:extLst>
           </p:spPr>
@@ -30019,7 +30356,7 @@
             <a:effectLst/>
             <a:extLst>
               <a:ext uri="{C572A759-6A51-4108-AA02-DFA0A04FC94B}">
-                <ma14:wrappingTextBoxFlag xmlns="" xmlns:wpc="http://schemas.microsoft.com/office/word/2010/wordprocessingCanvas" xmlns:mo="http://schemas.microsoft.com/office/mac/office/2008/main" xmlns:mc="http://schemas.openxmlformats.org/markup-compatibility/2006" xmlns:mv="urn:schemas-microsoft-com:mac:vml" xmlns:o="urn:schemas-microsoft-com:office:office" xmlns:m="http://schemas.openxmlformats.org/officeDocument/2006/math" xmlns:v="urn:schemas-microsoft-com:vml" xmlns:wp14="http://schemas.microsoft.com/office/word/2010/wordprocessingDrawing" xmlns:wp="http://schemas.openxmlformats.org/drawingml/2006/wordprocessingDrawing" xmlns:w10="urn:schemas-microsoft-com:office:word" xmlns:w="http://schemas.openxmlformats.org/wordprocessingml/2006/main" xmlns:w14="http://schemas.microsoft.com/office/word/2010/wordml" xmlns:wpg="http://schemas.microsoft.com/office/word/2010/wordprocessingGroup" xmlns:wpi="http://schemas.microsoft.com/office/word/2010/wordprocessingInk" xmlns:wne="http://schemas.microsoft.com/office/word/2006/wordml" xmlns:wps="http://schemas.microsoft.com/office/word/2010/wordprocessingShape" xmlns:ma14="http://schemas.microsoft.com/office/mac/drawingml/2011/main" xmlns:lc="http://schemas.openxmlformats.org/drawingml/2006/lockedCanvas"/>
+                <ma14:wrappingTextBoxFlag xmlns:lc="http://schemas.openxmlformats.org/drawingml/2006/lockedCanvas" xmlns:ma14="http://schemas.microsoft.com/office/mac/drawingml/2011/main" xmlns:wps="http://schemas.microsoft.com/office/word/2010/wordprocessingShape" xmlns:wne="http://schemas.microsoft.com/office/word/2006/wordml" xmlns:wpi="http://schemas.microsoft.com/office/word/2010/wordprocessingInk" xmlns:wpg="http://schemas.microsoft.com/office/word/2010/wordprocessingGroup" xmlns:w14="http://schemas.microsoft.com/office/word/2010/wordml" xmlns:w="http://schemas.openxmlformats.org/wordprocessingml/2006/main" xmlns:w10="urn:schemas-microsoft-com:office:word" xmlns:wp="http://schemas.openxmlformats.org/drawingml/2006/wordprocessingDrawing" xmlns:wp14="http://schemas.microsoft.com/office/word/2010/wordprocessingDrawing" xmlns:v="urn:schemas-microsoft-com:vml" xmlns:m="http://schemas.openxmlformats.org/officeDocument/2006/math" xmlns:o="urn:schemas-microsoft-com:office:office" xmlns:mv="urn:schemas-microsoft-com:mac:vml" xmlns:mc="http://schemas.openxmlformats.org/markup-compatibility/2006" xmlns:mo="http://schemas.microsoft.com/office/mac/office/2008/main" xmlns:wpc="http://schemas.microsoft.com/office/word/2010/wordprocessingCanvas" xmlns=""/>
               </a:ext>
             </a:extLst>
           </p:spPr>
@@ -30100,7 +30437,7 @@
             <a:effectLst/>
             <a:extLst>
               <a:ext uri="{C572A759-6A51-4108-AA02-DFA0A04FC94B}">
-                <ma14:wrappingTextBoxFlag xmlns="" xmlns:wpc="http://schemas.microsoft.com/office/word/2010/wordprocessingCanvas" xmlns:mo="http://schemas.microsoft.com/office/mac/office/2008/main" xmlns:mc="http://schemas.openxmlformats.org/markup-compatibility/2006" xmlns:mv="urn:schemas-microsoft-com:mac:vml" xmlns:o="urn:schemas-microsoft-com:office:office" xmlns:m="http://schemas.openxmlformats.org/officeDocument/2006/math" xmlns:v="urn:schemas-microsoft-com:vml" xmlns:wp14="http://schemas.microsoft.com/office/word/2010/wordprocessingDrawing" xmlns:wp="http://schemas.openxmlformats.org/drawingml/2006/wordprocessingDrawing" xmlns:w10="urn:schemas-microsoft-com:office:word" xmlns:w="http://schemas.openxmlformats.org/wordprocessingml/2006/main" xmlns:w14="http://schemas.microsoft.com/office/word/2010/wordml" xmlns:wpg="http://schemas.microsoft.com/office/word/2010/wordprocessingGroup" xmlns:wpi="http://schemas.microsoft.com/office/word/2010/wordprocessingInk" xmlns:wne="http://schemas.microsoft.com/office/word/2006/wordml" xmlns:wps="http://schemas.microsoft.com/office/word/2010/wordprocessingShape" xmlns:ma14="http://schemas.microsoft.com/office/mac/drawingml/2011/main" xmlns:lc="http://schemas.openxmlformats.org/drawingml/2006/lockedCanvas"/>
+                <ma14:wrappingTextBoxFlag xmlns:lc="http://schemas.openxmlformats.org/drawingml/2006/lockedCanvas" xmlns:ma14="http://schemas.microsoft.com/office/mac/drawingml/2011/main" xmlns:wps="http://schemas.microsoft.com/office/word/2010/wordprocessingShape" xmlns:wne="http://schemas.microsoft.com/office/word/2006/wordml" xmlns:wpi="http://schemas.microsoft.com/office/word/2010/wordprocessingInk" xmlns:wpg="http://schemas.microsoft.com/office/word/2010/wordprocessingGroup" xmlns:w14="http://schemas.microsoft.com/office/word/2010/wordml" xmlns:w="http://schemas.openxmlformats.org/wordprocessingml/2006/main" xmlns:w10="urn:schemas-microsoft-com:office:word" xmlns:wp="http://schemas.openxmlformats.org/drawingml/2006/wordprocessingDrawing" xmlns:wp14="http://schemas.microsoft.com/office/word/2010/wordprocessingDrawing" xmlns:v="urn:schemas-microsoft-com:vml" xmlns:m="http://schemas.openxmlformats.org/officeDocument/2006/math" xmlns:o="urn:schemas-microsoft-com:office:office" xmlns:mv="urn:schemas-microsoft-com:mac:vml" xmlns:mc="http://schemas.openxmlformats.org/markup-compatibility/2006" xmlns:mo="http://schemas.microsoft.com/office/mac/office/2008/main" xmlns:wpc="http://schemas.microsoft.com/office/word/2010/wordprocessingCanvas" xmlns=""/>
               </a:ext>
             </a:extLst>
           </p:spPr>
@@ -30181,7 +30518,7 @@
             <a:effectLst/>
             <a:extLst>
               <a:ext uri="{C572A759-6A51-4108-AA02-DFA0A04FC94B}">
-                <ma14:wrappingTextBoxFlag xmlns="" xmlns:wpc="http://schemas.microsoft.com/office/word/2010/wordprocessingCanvas" xmlns:mo="http://schemas.microsoft.com/office/mac/office/2008/main" xmlns:mc="http://schemas.openxmlformats.org/markup-compatibility/2006" xmlns:mv="urn:schemas-microsoft-com:mac:vml" xmlns:o="urn:schemas-microsoft-com:office:office" xmlns:m="http://schemas.openxmlformats.org/officeDocument/2006/math" xmlns:v="urn:schemas-microsoft-com:vml" xmlns:wp14="http://schemas.microsoft.com/office/word/2010/wordprocessingDrawing" xmlns:wp="http://schemas.openxmlformats.org/drawingml/2006/wordprocessingDrawing" xmlns:w10="urn:schemas-microsoft-com:office:word" xmlns:w="http://schemas.openxmlformats.org/wordprocessingml/2006/main" xmlns:w14="http://schemas.microsoft.com/office/word/2010/wordml" xmlns:wpg="http://schemas.microsoft.com/office/word/2010/wordprocessingGroup" xmlns:wpi="http://schemas.microsoft.com/office/word/2010/wordprocessingInk" xmlns:wne="http://schemas.microsoft.com/office/word/2006/wordml" xmlns:wps="http://schemas.microsoft.com/office/word/2010/wordprocessingShape" xmlns:ma14="http://schemas.microsoft.com/office/mac/drawingml/2011/main" xmlns:lc="http://schemas.openxmlformats.org/drawingml/2006/lockedCanvas"/>
+                <ma14:wrappingTextBoxFlag xmlns:lc="http://schemas.openxmlformats.org/drawingml/2006/lockedCanvas" xmlns:ma14="http://schemas.microsoft.com/office/mac/drawingml/2011/main" xmlns:wps="http://schemas.microsoft.com/office/word/2010/wordprocessingShape" xmlns:wne="http://schemas.microsoft.com/office/word/2006/wordml" xmlns:wpi="http://schemas.microsoft.com/office/word/2010/wordprocessingInk" xmlns:wpg="http://schemas.microsoft.com/office/word/2010/wordprocessingGroup" xmlns:w14="http://schemas.microsoft.com/office/word/2010/wordml" xmlns:w="http://schemas.openxmlformats.org/wordprocessingml/2006/main" xmlns:w10="urn:schemas-microsoft-com:office:word" xmlns:wp="http://schemas.openxmlformats.org/drawingml/2006/wordprocessingDrawing" xmlns:wp14="http://schemas.microsoft.com/office/word/2010/wordprocessingDrawing" xmlns:v="urn:schemas-microsoft-com:vml" xmlns:m="http://schemas.openxmlformats.org/officeDocument/2006/math" xmlns:o="urn:schemas-microsoft-com:office:office" xmlns:mv="urn:schemas-microsoft-com:mac:vml" xmlns:mc="http://schemas.openxmlformats.org/markup-compatibility/2006" xmlns:mo="http://schemas.microsoft.com/office/mac/office/2008/main" xmlns:wpc="http://schemas.microsoft.com/office/word/2010/wordprocessingCanvas" xmlns=""/>
               </a:ext>
             </a:extLst>
           </p:spPr>
@@ -30262,7 +30599,7 @@
             <a:effectLst/>
             <a:extLst>
               <a:ext uri="{C572A759-6A51-4108-AA02-DFA0A04FC94B}">
-                <ma14:wrappingTextBoxFlag xmlns="" xmlns:wpc="http://schemas.microsoft.com/office/word/2010/wordprocessingCanvas" xmlns:mo="http://schemas.microsoft.com/office/mac/office/2008/main" xmlns:mc="http://schemas.openxmlformats.org/markup-compatibility/2006" xmlns:mv="urn:schemas-microsoft-com:mac:vml" xmlns:o="urn:schemas-microsoft-com:office:office" xmlns:m="http://schemas.openxmlformats.org/officeDocument/2006/math" xmlns:v="urn:schemas-microsoft-com:vml" xmlns:wp14="http://schemas.microsoft.com/office/word/2010/wordprocessingDrawing" xmlns:wp="http://schemas.openxmlformats.org/drawingml/2006/wordprocessingDrawing" xmlns:w10="urn:schemas-microsoft-com:office:word" xmlns:w="http://schemas.openxmlformats.org/wordprocessingml/2006/main" xmlns:w14="http://schemas.microsoft.com/office/word/2010/wordml" xmlns:wpg="http://schemas.microsoft.com/office/word/2010/wordprocessingGroup" xmlns:wpi="http://schemas.microsoft.com/office/word/2010/wordprocessingInk" xmlns:wne="http://schemas.microsoft.com/office/word/2006/wordml" xmlns:wps="http://schemas.microsoft.com/office/word/2010/wordprocessingShape" xmlns:ma14="http://schemas.microsoft.com/office/mac/drawingml/2011/main" xmlns:lc="http://schemas.openxmlformats.org/drawingml/2006/lockedCanvas"/>
+                <ma14:wrappingTextBoxFlag xmlns:lc="http://schemas.openxmlformats.org/drawingml/2006/lockedCanvas" xmlns:ma14="http://schemas.microsoft.com/office/mac/drawingml/2011/main" xmlns:wps="http://schemas.microsoft.com/office/word/2010/wordprocessingShape" xmlns:wne="http://schemas.microsoft.com/office/word/2006/wordml" xmlns:wpi="http://schemas.microsoft.com/office/word/2010/wordprocessingInk" xmlns:wpg="http://schemas.microsoft.com/office/word/2010/wordprocessingGroup" xmlns:w14="http://schemas.microsoft.com/office/word/2010/wordml" xmlns:w="http://schemas.openxmlformats.org/wordprocessingml/2006/main" xmlns:w10="urn:schemas-microsoft-com:office:word" xmlns:wp="http://schemas.openxmlformats.org/drawingml/2006/wordprocessingDrawing" xmlns:wp14="http://schemas.microsoft.com/office/word/2010/wordprocessingDrawing" xmlns:v="urn:schemas-microsoft-com:vml" xmlns:m="http://schemas.openxmlformats.org/officeDocument/2006/math" xmlns:o="urn:schemas-microsoft-com:office:office" xmlns:mv="urn:schemas-microsoft-com:mac:vml" xmlns:mc="http://schemas.openxmlformats.org/markup-compatibility/2006" xmlns:mo="http://schemas.microsoft.com/office/mac/office/2008/main" xmlns:wpc="http://schemas.microsoft.com/office/word/2010/wordprocessingCanvas" xmlns=""/>
               </a:ext>
             </a:extLst>
           </p:spPr>
@@ -30378,7 +30715,7 @@
             <a:effectLst/>
             <a:extLst>
               <a:ext uri="{C572A759-6A51-4108-AA02-DFA0A04FC94B}">
-                <ma14:wrappingTextBoxFlag xmlns="" xmlns:wpc="http://schemas.microsoft.com/office/word/2010/wordprocessingCanvas" xmlns:mo="http://schemas.microsoft.com/office/mac/office/2008/main" xmlns:mc="http://schemas.openxmlformats.org/markup-compatibility/2006" xmlns:mv="urn:schemas-microsoft-com:mac:vml" xmlns:o="urn:schemas-microsoft-com:office:office" xmlns:m="http://schemas.openxmlformats.org/officeDocument/2006/math" xmlns:v="urn:schemas-microsoft-com:vml" xmlns:wp14="http://schemas.microsoft.com/office/word/2010/wordprocessingDrawing" xmlns:wp="http://schemas.openxmlformats.org/drawingml/2006/wordprocessingDrawing" xmlns:w10="urn:schemas-microsoft-com:office:word" xmlns:w="http://schemas.openxmlformats.org/wordprocessingml/2006/main" xmlns:w14="http://schemas.microsoft.com/office/word/2010/wordml" xmlns:wpg="http://schemas.microsoft.com/office/word/2010/wordprocessingGroup" xmlns:wpi="http://schemas.microsoft.com/office/word/2010/wordprocessingInk" xmlns:wne="http://schemas.microsoft.com/office/word/2006/wordml" xmlns:wps="http://schemas.microsoft.com/office/word/2010/wordprocessingShape" xmlns:ma14="http://schemas.microsoft.com/office/mac/drawingml/2011/main" xmlns:lc="http://schemas.openxmlformats.org/drawingml/2006/lockedCanvas"/>
+                <ma14:wrappingTextBoxFlag xmlns:lc="http://schemas.openxmlformats.org/drawingml/2006/lockedCanvas" xmlns:ma14="http://schemas.microsoft.com/office/mac/drawingml/2011/main" xmlns:wps="http://schemas.microsoft.com/office/word/2010/wordprocessingShape" xmlns:wne="http://schemas.microsoft.com/office/word/2006/wordml" xmlns:wpi="http://schemas.microsoft.com/office/word/2010/wordprocessingInk" xmlns:wpg="http://schemas.microsoft.com/office/word/2010/wordprocessingGroup" xmlns:w14="http://schemas.microsoft.com/office/word/2010/wordml" xmlns:w="http://schemas.openxmlformats.org/wordprocessingml/2006/main" xmlns:w10="urn:schemas-microsoft-com:office:word" xmlns:wp="http://schemas.openxmlformats.org/drawingml/2006/wordprocessingDrawing" xmlns:wp14="http://schemas.microsoft.com/office/word/2010/wordprocessingDrawing" xmlns:v="urn:schemas-microsoft-com:vml" xmlns:m="http://schemas.openxmlformats.org/officeDocument/2006/math" xmlns:o="urn:schemas-microsoft-com:office:office" xmlns:mv="urn:schemas-microsoft-com:mac:vml" xmlns:mc="http://schemas.openxmlformats.org/markup-compatibility/2006" xmlns:mo="http://schemas.microsoft.com/office/mac/office/2008/main" xmlns:wpc="http://schemas.microsoft.com/office/word/2010/wordprocessingCanvas" xmlns=""/>
               </a:ext>
             </a:extLst>
           </p:spPr>
@@ -30494,7 +30831,7 @@
             <a:effectLst/>
             <a:extLst>
               <a:ext uri="{C572A759-6A51-4108-AA02-DFA0A04FC94B}">
-                <ma14:wrappingTextBoxFlag xmlns="" xmlns:wpc="http://schemas.microsoft.com/office/word/2010/wordprocessingCanvas" xmlns:mo="http://schemas.microsoft.com/office/mac/office/2008/main" xmlns:mc="http://schemas.openxmlformats.org/markup-compatibility/2006" xmlns:mv="urn:schemas-microsoft-com:mac:vml" xmlns:o="urn:schemas-microsoft-com:office:office" xmlns:m="http://schemas.openxmlformats.org/officeDocument/2006/math" xmlns:v="urn:schemas-microsoft-com:vml" xmlns:wp14="http://schemas.microsoft.com/office/word/2010/wordprocessingDrawing" xmlns:wp="http://schemas.openxmlformats.org/drawingml/2006/wordprocessingDrawing" xmlns:w10="urn:schemas-microsoft-com:office:word" xmlns:w="http://schemas.openxmlformats.org/wordprocessingml/2006/main" xmlns:w14="http://schemas.microsoft.com/office/word/2010/wordml" xmlns:wpg="http://schemas.microsoft.com/office/word/2010/wordprocessingGroup" xmlns:wpi="http://schemas.microsoft.com/office/word/2010/wordprocessingInk" xmlns:wne="http://schemas.microsoft.com/office/word/2006/wordml" xmlns:wps="http://schemas.microsoft.com/office/word/2010/wordprocessingShape" xmlns:ma14="http://schemas.microsoft.com/office/mac/drawingml/2011/main" xmlns:lc="http://schemas.openxmlformats.org/drawingml/2006/lockedCanvas"/>
+                <ma14:wrappingTextBoxFlag xmlns:lc="http://schemas.openxmlformats.org/drawingml/2006/lockedCanvas" xmlns:ma14="http://schemas.microsoft.com/office/mac/drawingml/2011/main" xmlns:wps="http://schemas.microsoft.com/office/word/2010/wordprocessingShape" xmlns:wne="http://schemas.microsoft.com/office/word/2006/wordml" xmlns:wpi="http://schemas.microsoft.com/office/word/2010/wordprocessingInk" xmlns:wpg="http://schemas.microsoft.com/office/word/2010/wordprocessingGroup" xmlns:w14="http://schemas.microsoft.com/office/word/2010/wordml" xmlns:w="http://schemas.openxmlformats.org/wordprocessingml/2006/main" xmlns:w10="urn:schemas-microsoft-com:office:word" xmlns:wp="http://schemas.openxmlformats.org/drawingml/2006/wordprocessingDrawing" xmlns:wp14="http://schemas.microsoft.com/office/word/2010/wordprocessingDrawing" xmlns:v="urn:schemas-microsoft-com:vml" xmlns:m="http://schemas.openxmlformats.org/officeDocument/2006/math" xmlns:o="urn:schemas-microsoft-com:office:office" xmlns:mv="urn:schemas-microsoft-com:mac:vml" xmlns:mc="http://schemas.openxmlformats.org/markup-compatibility/2006" xmlns:mo="http://schemas.microsoft.com/office/mac/office/2008/main" xmlns:wpc="http://schemas.microsoft.com/office/word/2010/wordprocessingCanvas" xmlns=""/>
               </a:ext>
             </a:extLst>
           </p:spPr>

</xml_diff>

<commit_message>
Add slide 73 on Contructors
</commit_message>
<xml_diff>
--- a/curriculum/Unit6/Unit6.pptx
+++ b/curriculum/Unit6/Unit6.pptx
@@ -5,7 +5,7 @@
     <p:sldMasterId id="2147483648" r:id="rId4"/>
   </p:sldMasterIdLst>
   <p:notesMasterIdLst>
-    <p:notesMasterId r:id="rId98"/>
+    <p:notesMasterId r:id="rId99"/>
   </p:notesMasterIdLst>
   <p:sldIdLst>
     <p:sldId id="256" r:id="rId5"/>
@@ -80,27 +80,28 @@
     <p:sldId id="330" r:id="rId74"/>
     <p:sldId id="331" r:id="rId75"/>
     <p:sldId id="332" r:id="rId76"/>
-    <p:sldId id="333" r:id="rId77"/>
-    <p:sldId id="334" r:id="rId78"/>
-    <p:sldId id="335" r:id="rId79"/>
-    <p:sldId id="336" r:id="rId80"/>
-    <p:sldId id="337" r:id="rId81"/>
-    <p:sldId id="338" r:id="rId82"/>
-    <p:sldId id="339" r:id="rId83"/>
-    <p:sldId id="340" r:id="rId84"/>
-    <p:sldId id="341" r:id="rId85"/>
-    <p:sldId id="342" r:id="rId86"/>
-    <p:sldId id="343" r:id="rId87"/>
-    <p:sldId id="344" r:id="rId88"/>
-    <p:sldId id="345" r:id="rId89"/>
-    <p:sldId id="346" r:id="rId90"/>
-    <p:sldId id="347" r:id="rId91"/>
-    <p:sldId id="348" r:id="rId92"/>
-    <p:sldId id="349" r:id="rId93"/>
-    <p:sldId id="350" r:id="rId94"/>
-    <p:sldId id="351" r:id="rId95"/>
-    <p:sldId id="352" r:id="rId96"/>
-    <p:sldId id="353" r:id="rId97"/>
+    <p:sldId id="370" r:id="rId77"/>
+    <p:sldId id="333" r:id="rId78"/>
+    <p:sldId id="334" r:id="rId79"/>
+    <p:sldId id="335" r:id="rId80"/>
+    <p:sldId id="336" r:id="rId81"/>
+    <p:sldId id="337" r:id="rId82"/>
+    <p:sldId id="338" r:id="rId83"/>
+    <p:sldId id="339" r:id="rId84"/>
+    <p:sldId id="340" r:id="rId85"/>
+    <p:sldId id="341" r:id="rId86"/>
+    <p:sldId id="342" r:id="rId87"/>
+    <p:sldId id="343" r:id="rId88"/>
+    <p:sldId id="344" r:id="rId89"/>
+    <p:sldId id="345" r:id="rId90"/>
+    <p:sldId id="346" r:id="rId91"/>
+    <p:sldId id="347" r:id="rId92"/>
+    <p:sldId id="348" r:id="rId93"/>
+    <p:sldId id="349" r:id="rId94"/>
+    <p:sldId id="350" r:id="rId95"/>
+    <p:sldId id="351" r:id="rId96"/>
+    <p:sldId id="352" r:id="rId97"/>
+    <p:sldId id="353" r:id="rId98"/>
   </p:sldIdLst>
   <p:sldSz cx="12192000" cy="6858000"/>
   <p:notesSz cx="6858000" cy="9144000"/>
@@ -16541,7 +16542,7 @@
           <a:p>
             <a:fld id="{C56969A0-B3EA-45A4-A390-44554200A62E}" type="slidenum">
               <a:rPr lang="en-US" smtClean="0"/>
-              <a:t>75</a:t>
+              <a:t>76</a:t>
             </a:fld>
             <a:endParaRPr lang="en-US"/>
           </a:p>
@@ -16625,7 +16626,7 @@
           <a:p>
             <a:fld id="{C56969A0-B3EA-45A4-A390-44554200A62E}" type="slidenum">
               <a:rPr lang="en-US" smtClean="0"/>
-              <a:t>83</a:t>
+              <a:t>84</a:t>
             </a:fld>
             <a:endParaRPr lang="en-US"/>
           </a:p>
@@ -16721,7 +16722,7 @@
           <a:p>
             <a:fld id="{C56969A0-B3EA-45A4-A390-44554200A62E}" type="slidenum">
               <a:rPr lang="en-US" smtClean="0"/>
-              <a:t>85</a:t>
+              <a:t>86</a:t>
             </a:fld>
             <a:endParaRPr lang="en-US"/>
           </a:p>
@@ -16805,7 +16806,7 @@
           <a:p>
             <a:fld id="{C56969A0-B3EA-45A4-A390-44554200A62E}" type="slidenum">
               <a:rPr lang="en-US" smtClean="0"/>
-              <a:t>89</a:t>
+              <a:t>90</a:t>
             </a:fld>
             <a:endParaRPr lang="en-US"/>
           </a:p>
@@ -29755,7 +29756,13 @@
       </p:grpSpPr>
       <p:sp>
         <p:nvSpPr>
-          <p:cNvPr id="2" name="Title 1"/>
+          <p:cNvPr id="2" name="Title 1">
+            <a:extLst>
+              <a:ext uri="{FF2B5EF4-FFF2-40B4-BE49-F238E27FC236}">
+                <a16:creationId xmlns:a16="http://schemas.microsoft.com/office/drawing/2014/main" id="{BB4B3D72-5930-4999-8EA6-E76E0485F240}"/>
+              </a:ext>
+            </a:extLst>
+          </p:cNvPr>
           <p:cNvSpPr>
             <a:spLocks noGrp="1"/>
           </p:cNvSpPr>
@@ -29763,20 +29770,149 @@
             <p:ph type="title"/>
           </p:nvPr>
         </p:nvSpPr>
-        <p:spPr>
-          <a:xfrm>
-            <a:off x="838200" y="2752383"/>
-            <a:ext cx="10515600" cy="1157288"/>
-          </a:xfrm>
-        </p:spPr>
+        <p:spPr/>
         <p:txBody>
           <a:bodyPr/>
           <a:lstStyle/>
           <a:p>
-            <a:pPr algn="ctr"/>
             <a:r>
               <a:rPr lang="en-US" dirty="0"/>
-              <a:t>Worksheet 6.5: Trio</a:t>
+              <a:t>Constructors</a:t>
+            </a:r>
+          </a:p>
+        </p:txBody>
+      </p:sp>
+      <p:sp>
+        <p:nvSpPr>
+          <p:cNvPr id="3" name="Content Placeholder 2">
+            <a:extLst>
+              <a:ext uri="{FF2B5EF4-FFF2-40B4-BE49-F238E27FC236}">
+                <a16:creationId xmlns:a16="http://schemas.microsoft.com/office/drawing/2014/main" id="{4D13C041-DCF5-425D-B03C-A6CA3F915AFE}"/>
+              </a:ext>
+            </a:extLst>
+          </p:cNvPr>
+          <p:cNvSpPr>
+            <a:spLocks noGrp="1"/>
+          </p:cNvSpPr>
+          <p:nvPr>
+            <p:ph idx="1"/>
+          </p:nvPr>
+        </p:nvSpPr>
+        <p:spPr/>
+        <p:txBody>
+          <a:bodyPr>
+            <a:normAutofit fontScale="85000" lnSpcReduction="20000"/>
+          </a:bodyPr>
+          <a:lstStyle/>
+          <a:p>
+            <a:r>
+              <a:rPr lang="en-US" dirty="0"/>
+              <a:t>If no constructor in specified, the compiler will add a no-argument constructor. </a:t>
+            </a:r>
+          </a:p>
+          <a:p>
+            <a:pPr lvl="1"/>
+            <a:r>
+              <a:rPr lang="en-US" dirty="0"/>
+              <a:t>A no-argument constructor has no parameters, for example </a:t>
+            </a:r>
+            <a:r>
+              <a:rPr lang="en-US" dirty="0">
+                <a:latin typeface="Courier New" panose="02070309020205020404" pitchFamily="49" charset="0"/>
+                <a:cs typeface="Courier New" panose="02070309020205020404" pitchFamily="49" charset="0"/>
+              </a:rPr>
+              <a:t>public Zoo()</a:t>
+            </a:r>
+            <a:r>
+              <a:rPr lang="en-US" dirty="0"/>
+              <a:t>.</a:t>
+            </a:r>
+          </a:p>
+          <a:p>
+            <a:endParaRPr lang="en-US" dirty="0"/>
+          </a:p>
+          <a:p>
+            <a:r>
+              <a:rPr lang="en-US" dirty="0"/>
+              <a:t>If a subclass has no call to a superclass constructor using </a:t>
+            </a:r>
+            <a:r>
+              <a:rPr lang="en-US" dirty="0">
+                <a:latin typeface="Courier New" panose="02070309020205020404" pitchFamily="49" charset="0"/>
+                <a:cs typeface="Courier New" panose="02070309020205020404" pitchFamily="49" charset="0"/>
+              </a:rPr>
+              <a:t>super</a:t>
+            </a:r>
+            <a:r>
+              <a:rPr lang="en-US" dirty="0"/>
+              <a:t> as the first line in a subclass constructor, then the compiler will automatically add a </a:t>
+            </a:r>
+            <a:r>
+              <a:rPr lang="en-US" dirty="0">
+                <a:latin typeface="Courier New" panose="02070309020205020404" pitchFamily="49" charset="0"/>
+                <a:cs typeface="Courier New" panose="02070309020205020404" pitchFamily="49" charset="0"/>
+              </a:rPr>
+              <a:t>super()</a:t>
+            </a:r>
+            <a:r>
+              <a:rPr lang="en-US" dirty="0"/>
+              <a:t> call as the first line in a constructor. </a:t>
+            </a:r>
+          </a:p>
+          <a:p>
+            <a:pPr lvl="1"/>
+            <a:r>
+              <a:rPr lang="en-US" dirty="0"/>
+              <a:t>provide no-argument constructors in parent classes </a:t>
+            </a:r>
+          </a:p>
+          <a:p>
+            <a:pPr lvl="1"/>
+            <a:r>
+              <a:rPr lang="en-US" dirty="0"/>
+              <a:t>or be sure to use an explicit call to </a:t>
+            </a:r>
+            <a:r>
+              <a:rPr lang="en-US" dirty="0">
+                <a:latin typeface="Courier New" panose="02070309020205020404" pitchFamily="49" charset="0"/>
+                <a:cs typeface="Courier New" panose="02070309020205020404" pitchFamily="49" charset="0"/>
+              </a:rPr>
+              <a:t>super()</a:t>
+            </a:r>
+            <a:r>
+              <a:rPr lang="en-US" dirty="0"/>
+              <a:t> as the first line in the constructors of subclasses.</a:t>
+            </a:r>
+          </a:p>
+          <a:p>
+            <a:endParaRPr lang="en-US" dirty="0"/>
+          </a:p>
+          <a:p>
+            <a:r>
+              <a:rPr lang="en-US" dirty="0"/>
+              <a:t>Regardless of whether the superclass constructor is called implicitly or explicitly, the process of calling superclass constructors continues until the </a:t>
+            </a:r>
+            <a:r>
+              <a:rPr lang="en-US" dirty="0">
+                <a:latin typeface="Courier New" panose="02070309020205020404" pitchFamily="49" charset="0"/>
+                <a:cs typeface="Courier New" panose="02070309020205020404" pitchFamily="49" charset="0"/>
+              </a:rPr>
+              <a:t>Object</a:t>
+            </a:r>
+            <a:r>
+              <a:rPr lang="en-US" dirty="0"/>
+              <a:t> constructor is called since every class inherits from the </a:t>
+            </a:r>
+            <a:r>
+              <a:rPr lang="en-US" dirty="0">
+                <a:latin typeface="Courier New" panose="02070309020205020404" pitchFamily="49" charset="0"/>
+                <a:cs typeface="Courier New" panose="02070309020205020404" pitchFamily="49" charset="0"/>
+              </a:rPr>
+              <a:t>Object</a:t>
+            </a:r>
+            <a:r>
+              <a:rPr lang="en-US" dirty="0"/>
+              <a:t> class.</a:t>
             </a:r>
           </a:p>
         </p:txBody>
@@ -29784,7 +29920,7 @@
     </p:spTree>
     <p:extLst>
       <p:ext uri="{BB962C8B-B14F-4D97-AF65-F5344CB8AC3E}">
-        <p14:creationId xmlns:p14="http://schemas.microsoft.com/office/powerpoint/2010/main" val="2398621642"/>
+        <p14:creationId xmlns:p14="http://schemas.microsoft.com/office/powerpoint/2010/main" val="86351906"/>
       </p:ext>
     </p:extLst>
   </p:cSld>
@@ -29821,6 +29957,64 @@
             <p:ph type="title"/>
           </p:nvPr>
         </p:nvSpPr>
+        <p:spPr>
+          <a:xfrm>
+            <a:off x="838200" y="2752383"/>
+            <a:ext cx="10515600" cy="1157288"/>
+          </a:xfrm>
+        </p:spPr>
+        <p:txBody>
+          <a:bodyPr/>
+          <a:lstStyle/>
+          <a:p>
+            <a:pPr algn="ctr"/>
+            <a:r>
+              <a:rPr lang="en-US" dirty="0"/>
+              <a:t>Worksheet 6.5: Trio</a:t>
+            </a:r>
+          </a:p>
+        </p:txBody>
+      </p:sp>
+    </p:spTree>
+    <p:extLst>
+      <p:ext uri="{BB962C8B-B14F-4D97-AF65-F5344CB8AC3E}">
+        <p14:creationId xmlns:p14="http://schemas.microsoft.com/office/powerpoint/2010/main" val="2398621642"/>
+      </p:ext>
+    </p:extLst>
+  </p:cSld>
+  <p:clrMapOvr>
+    <a:masterClrMapping/>
+  </p:clrMapOvr>
+</p:sld>
+</file>
+
+<file path=ppt/slides/slide75.xml><?xml version="1.0" encoding="utf-8"?>
+<p:sld xmlns:a="http://schemas.openxmlformats.org/drawingml/2006/main" xmlns:r="http://schemas.openxmlformats.org/officeDocument/2006/relationships" xmlns:p="http://schemas.openxmlformats.org/presentationml/2006/main">
+  <p:cSld>
+    <p:spTree>
+      <p:nvGrpSpPr>
+        <p:cNvPr id="1" name=""/>
+        <p:cNvGrpSpPr/>
+        <p:nvPr/>
+      </p:nvGrpSpPr>
+      <p:grpSpPr>
+        <a:xfrm>
+          <a:off x="0" y="0"/>
+          <a:ext cx="0" cy="0"/>
+          <a:chOff x="0" y="0"/>
+          <a:chExt cx="0" cy="0"/>
+        </a:xfrm>
+      </p:grpSpPr>
+      <p:sp>
+        <p:nvSpPr>
+          <p:cNvPr id="2" name="Title 1"/>
+          <p:cNvSpPr>
+            <a:spLocks noGrp="1"/>
+          </p:cNvSpPr>
+          <p:nvPr>
+            <p:ph type="title"/>
+          </p:nvPr>
+        </p:nvSpPr>
         <p:spPr/>
         <p:txBody>
           <a:bodyPr>
@@ -29879,7 +30073,7 @@
 </p:sld>
 </file>
 
-<file path=ppt/slides/slide75.xml><?xml version="1.0" encoding="utf-8"?>
+<file path=ppt/slides/slide76.xml><?xml version="1.0" encoding="utf-8"?>
 <p:sld xmlns:a="http://schemas.openxmlformats.org/drawingml/2006/main" xmlns:r="http://schemas.openxmlformats.org/officeDocument/2006/relationships" xmlns:p="http://schemas.openxmlformats.org/presentationml/2006/main">
   <p:cSld>
     <p:spTree>
@@ -29954,104 +30148,6 @@
     <p:extLst>
       <p:ext uri="{BB962C8B-B14F-4D97-AF65-F5344CB8AC3E}">
         <p14:creationId xmlns:p14="http://schemas.microsoft.com/office/powerpoint/2010/main" val="546057595"/>
-      </p:ext>
-    </p:extLst>
-  </p:cSld>
-  <p:clrMapOvr>
-    <a:masterClrMapping/>
-  </p:clrMapOvr>
-</p:sld>
-</file>
-
-<file path=ppt/slides/slide76.xml><?xml version="1.0" encoding="utf-8"?>
-<p:sld xmlns:a="http://schemas.openxmlformats.org/drawingml/2006/main" xmlns:r="http://schemas.openxmlformats.org/officeDocument/2006/relationships" xmlns:p="http://schemas.openxmlformats.org/presentationml/2006/main">
-  <p:cSld>
-    <p:spTree>
-      <p:nvGrpSpPr>
-        <p:cNvPr id="1" name=""/>
-        <p:cNvGrpSpPr/>
-        <p:nvPr/>
-      </p:nvGrpSpPr>
-      <p:grpSpPr>
-        <a:xfrm>
-          <a:off x="0" y="0"/>
-          <a:ext cx="0" cy="0"/>
-          <a:chOff x="0" y="0"/>
-          <a:chExt cx="0" cy="0"/>
-        </a:xfrm>
-      </p:grpSpPr>
-      <p:sp>
-        <p:nvSpPr>
-          <p:cNvPr id="2" name="Title 1"/>
-          <p:cNvSpPr>
-            <a:spLocks noGrp="1"/>
-          </p:cNvSpPr>
-          <p:nvPr>
-            <p:ph type="title"/>
-          </p:nvPr>
-        </p:nvSpPr>
-        <p:spPr/>
-        <p:txBody>
-          <a:bodyPr/>
-          <a:lstStyle/>
-          <a:p>
-            <a:r>
-              <a:rPr lang="en-US" dirty="0"/>
-              <a:t>What are some limitations to inheritance?</a:t>
-            </a:r>
-          </a:p>
-        </p:txBody>
-      </p:sp>
-      <p:sp>
-        <p:nvSpPr>
-          <p:cNvPr id="3" name="Content Placeholder 2"/>
-          <p:cNvSpPr>
-            <a:spLocks noGrp="1"/>
-          </p:cNvSpPr>
-          <p:nvPr>
-            <p:ph idx="1"/>
-          </p:nvPr>
-        </p:nvSpPr>
-        <p:spPr/>
-        <p:txBody>
-          <a:bodyPr/>
-          <a:lstStyle/>
-          <a:p>
-            <a:pPr marL="0" indent="0">
-              <a:buNone/>
-            </a:pPr>
-            <a:endParaRPr lang="en-US" dirty="0"/>
-          </a:p>
-          <a:p>
-            <a:pPr marL="0" indent="0">
-              <a:buNone/>
-            </a:pPr>
-            <a:r>
-              <a:rPr lang="en-US" dirty="0"/>
-              <a:t>Can we inherit code from more than one superclass?</a:t>
-            </a:r>
-          </a:p>
-          <a:p>
-            <a:pPr marL="0" indent="0">
-              <a:buNone/>
-            </a:pPr>
-            <a:endParaRPr lang="en-US" dirty="0"/>
-          </a:p>
-          <a:p>
-            <a:pPr marL="0" indent="0">
-              <a:buNone/>
-            </a:pPr>
-            <a:r>
-              <a:rPr lang="en-US" dirty="0"/>
-              <a:t>Can we have an is-a relationship or polymorphism without giving the subclass access to our code?</a:t>
-            </a:r>
-          </a:p>
-        </p:txBody>
-      </p:sp>
-    </p:spTree>
-    <p:extLst>
-      <p:ext uri="{BB962C8B-B14F-4D97-AF65-F5344CB8AC3E}">
-        <p14:creationId xmlns:p14="http://schemas.microsoft.com/office/powerpoint/2010/main" val="1214770709"/>
       </p:ext>
     </p:extLst>
   </p:cSld>
@@ -30090,14 +30186,12 @@
         </p:nvSpPr>
         <p:spPr/>
         <p:txBody>
-          <a:bodyPr>
-            <a:normAutofit/>
-          </a:bodyPr>
+          <a:bodyPr/>
           <a:lstStyle/>
           <a:p>
             <a:r>
               <a:rPr lang="en-US" dirty="0"/>
-              <a:t>Interfaces</a:t>
+              <a:t>What are some limitations to inheritance?</a:t>
             </a:r>
           </a:p>
         </p:txBody>
@@ -30120,6 +30214,106 @@
             <a:pPr marL="0" indent="0">
               <a:buNone/>
             </a:pPr>
+            <a:endParaRPr lang="en-US" dirty="0"/>
+          </a:p>
+          <a:p>
+            <a:pPr marL="0" indent="0">
+              <a:buNone/>
+            </a:pPr>
+            <a:r>
+              <a:rPr lang="en-US" dirty="0"/>
+              <a:t>Can we inherit code from more than one superclass?</a:t>
+            </a:r>
+          </a:p>
+          <a:p>
+            <a:pPr marL="0" indent="0">
+              <a:buNone/>
+            </a:pPr>
+            <a:endParaRPr lang="en-US" dirty="0"/>
+          </a:p>
+          <a:p>
+            <a:pPr marL="0" indent="0">
+              <a:buNone/>
+            </a:pPr>
+            <a:r>
+              <a:rPr lang="en-US" dirty="0"/>
+              <a:t>Can we have an is-a relationship or polymorphism without giving the subclass access to our code?</a:t>
+            </a:r>
+          </a:p>
+        </p:txBody>
+      </p:sp>
+    </p:spTree>
+    <p:extLst>
+      <p:ext uri="{BB962C8B-B14F-4D97-AF65-F5344CB8AC3E}">
+        <p14:creationId xmlns:p14="http://schemas.microsoft.com/office/powerpoint/2010/main" val="1214770709"/>
+      </p:ext>
+    </p:extLst>
+  </p:cSld>
+  <p:clrMapOvr>
+    <a:masterClrMapping/>
+  </p:clrMapOvr>
+</p:sld>
+</file>
+
+<file path=ppt/slides/slide78.xml><?xml version="1.0" encoding="utf-8"?>
+<p:sld xmlns:a="http://schemas.openxmlformats.org/drawingml/2006/main" xmlns:r="http://schemas.openxmlformats.org/officeDocument/2006/relationships" xmlns:p="http://schemas.openxmlformats.org/presentationml/2006/main">
+  <p:cSld>
+    <p:spTree>
+      <p:nvGrpSpPr>
+        <p:cNvPr id="1" name=""/>
+        <p:cNvGrpSpPr/>
+        <p:nvPr/>
+      </p:nvGrpSpPr>
+      <p:grpSpPr>
+        <a:xfrm>
+          <a:off x="0" y="0"/>
+          <a:ext cx="0" cy="0"/>
+          <a:chOff x="0" y="0"/>
+          <a:chExt cx="0" cy="0"/>
+        </a:xfrm>
+      </p:grpSpPr>
+      <p:sp>
+        <p:nvSpPr>
+          <p:cNvPr id="2" name="Title 1"/>
+          <p:cNvSpPr>
+            <a:spLocks noGrp="1"/>
+          </p:cNvSpPr>
+          <p:nvPr>
+            <p:ph type="title"/>
+          </p:nvPr>
+        </p:nvSpPr>
+        <p:spPr/>
+        <p:txBody>
+          <a:bodyPr>
+            <a:normAutofit/>
+          </a:bodyPr>
+          <a:lstStyle/>
+          <a:p>
+            <a:r>
+              <a:rPr lang="en-US" dirty="0"/>
+              <a:t>Interfaces</a:t>
+            </a:r>
+          </a:p>
+        </p:txBody>
+      </p:sp>
+      <p:sp>
+        <p:nvSpPr>
+          <p:cNvPr id="3" name="Content Placeholder 2"/>
+          <p:cNvSpPr>
+            <a:spLocks noGrp="1"/>
+          </p:cNvSpPr>
+          <p:nvPr>
+            <p:ph idx="1"/>
+          </p:nvPr>
+        </p:nvSpPr>
+        <p:spPr/>
+        <p:txBody>
+          <a:bodyPr/>
+          <a:lstStyle/>
+          <a:p>
+            <a:pPr marL="0" indent="0">
+              <a:buNone/>
+            </a:pPr>
             <a:r>
               <a:rPr lang="en-US" dirty="0"/>
               <a:t>Offer a means to share a common </a:t>
@@ -30196,7 +30390,7 @@
 </p:sld>
 </file>
 
-<file path=ppt/slides/slide78.xml><?xml version="1.0" encoding="utf-8"?>
+<file path=ppt/slides/slide79.xml><?xml version="1.0" encoding="utf-8"?>
 <p:sld xmlns:a="http://schemas.openxmlformats.org/drawingml/2006/main" xmlns:r="http://schemas.openxmlformats.org/officeDocument/2006/relationships" xmlns:p="http://schemas.openxmlformats.org/presentationml/2006/main">
   <p:cSld>
     <p:spTree>
@@ -31116,371 +31310,6 @@
 </p:sld>
 </file>
 
-<file path=ppt/slides/slide79.xml><?xml version="1.0" encoding="utf-8"?>
-<p:sld xmlns:a="http://schemas.openxmlformats.org/drawingml/2006/main" xmlns:r="http://schemas.openxmlformats.org/officeDocument/2006/relationships" xmlns:p="http://schemas.openxmlformats.org/presentationml/2006/main">
-  <p:cSld>
-    <p:spTree>
-      <p:nvGrpSpPr>
-        <p:cNvPr id="1" name=""/>
-        <p:cNvGrpSpPr/>
-        <p:nvPr/>
-      </p:nvGrpSpPr>
-      <p:grpSpPr>
-        <a:xfrm>
-          <a:off x="0" y="0"/>
-          <a:ext cx="0" cy="0"/>
-          <a:chOff x="0" y="0"/>
-          <a:chExt cx="0" cy="0"/>
-        </a:xfrm>
-      </p:grpSpPr>
-      <p:sp>
-        <p:nvSpPr>
-          <p:cNvPr id="2" name="Title 1"/>
-          <p:cNvSpPr>
-            <a:spLocks noGrp="1"/>
-          </p:cNvSpPr>
-          <p:nvPr>
-            <p:ph type="title"/>
-          </p:nvPr>
-        </p:nvSpPr>
-        <p:spPr/>
-        <p:txBody>
-          <a:bodyPr/>
-          <a:lstStyle/>
-          <a:p>
-            <a:r>
-              <a:rPr lang="en-US" dirty="0"/>
-              <a:t>Declaring Interfaces</a:t>
-            </a:r>
-          </a:p>
-        </p:txBody>
-      </p:sp>
-      <p:sp>
-        <p:nvSpPr>
-          <p:cNvPr id="3" name="Content Placeholder 2"/>
-          <p:cNvSpPr>
-            <a:spLocks noGrp="1"/>
-          </p:cNvSpPr>
-          <p:nvPr>
-            <p:ph idx="1"/>
-          </p:nvPr>
-        </p:nvSpPr>
-        <p:spPr/>
-        <p:txBody>
-          <a:bodyPr>
-            <a:normAutofit fontScale="92500" lnSpcReduction="10000"/>
-          </a:bodyPr>
-          <a:lstStyle/>
-          <a:p>
-            <a:pPr marL="0" indent="0">
-              <a:buNone/>
-            </a:pPr>
-            <a:r>
-              <a:rPr lang="en-US" sz="1400" dirty="0">
-                <a:latin typeface="Courier New" panose="02070309020205020404" pitchFamily="49" charset="0"/>
-                <a:cs typeface="Courier New" panose="02070309020205020404" pitchFamily="49" charset="0"/>
-              </a:rPr>
-              <a:t>public interface Salty{</a:t>
-            </a:r>
-          </a:p>
-          <a:p>
-            <a:pPr marL="0" indent="0">
-              <a:buNone/>
-            </a:pPr>
-            <a:r>
-              <a:rPr lang="en-US" sz="1400" dirty="0">
-                <a:latin typeface="Courier New" panose="02070309020205020404" pitchFamily="49" charset="0"/>
-                <a:cs typeface="Courier New" panose="02070309020205020404" pitchFamily="49" charset="0"/>
-              </a:rPr>
-              <a:t>	double </a:t>
-            </a:r>
-            <a:r>
-              <a:rPr lang="en-US" sz="1400" dirty="0" err="1">
-                <a:latin typeface="Courier New" panose="02070309020205020404" pitchFamily="49" charset="0"/>
-                <a:cs typeface="Courier New" panose="02070309020205020404" pitchFamily="49" charset="0"/>
-              </a:rPr>
-              <a:t>sodiumContent</a:t>
-            </a:r>
-            <a:r>
-              <a:rPr lang="en-US" sz="1400" dirty="0">
-                <a:latin typeface="Courier New" panose="02070309020205020404" pitchFamily="49" charset="0"/>
-                <a:cs typeface="Courier New" panose="02070309020205020404" pitchFamily="49" charset="0"/>
-              </a:rPr>
-              <a:t>();      	</a:t>
-            </a:r>
-            <a:r>
-              <a:rPr lang="en-US" sz="1400" dirty="0">
-                <a:latin typeface="Courier New" panose="02070309020205020404" pitchFamily="49" charset="0"/>
-                <a:cs typeface="Courier New" panose="02070309020205020404" pitchFamily="49" charset="0"/>
-                <a:sym typeface="Wingdings" panose="05000000000000000000" pitchFamily="2" charset="2"/>
-              </a:rPr>
-              <a:t></a:t>
-            </a:r>
-            <a:r>
-              <a:rPr lang="en-US" sz="1400" dirty="0">
-                <a:latin typeface="Courier New" panose="02070309020205020404" pitchFamily="49" charset="0"/>
-                <a:cs typeface="Courier New" panose="02070309020205020404" pitchFamily="49" charset="0"/>
-              </a:rPr>
-              <a:t>this is a promise to implement the </a:t>
-            </a:r>
-            <a:r>
-              <a:rPr lang="en-US" sz="1400" dirty="0" err="1">
-                <a:latin typeface="Courier New" panose="02070309020205020404" pitchFamily="49" charset="0"/>
-                <a:cs typeface="Courier New" panose="02070309020205020404" pitchFamily="49" charset="0"/>
-              </a:rPr>
-              <a:t>sodiumContent</a:t>
-            </a:r>
-            <a:r>
-              <a:rPr lang="en-US" sz="1400" dirty="0">
-                <a:latin typeface="Courier New" panose="02070309020205020404" pitchFamily="49" charset="0"/>
-                <a:cs typeface="Courier New" panose="02070309020205020404" pitchFamily="49" charset="0"/>
-              </a:rPr>
-              <a:t> </a:t>
-            </a:r>
-          </a:p>
-          <a:p>
-            <a:pPr marL="0" indent="0">
-              <a:buNone/>
-            </a:pPr>
-            <a:r>
-              <a:rPr lang="en-US" sz="1400" dirty="0">
-                <a:latin typeface="Courier New" panose="02070309020205020404" pitchFamily="49" charset="0"/>
-                <a:cs typeface="Courier New" panose="02070309020205020404" pitchFamily="49" charset="0"/>
-              </a:rPr>
-              <a:t>}				 	in the class that implements the Salty interface.</a:t>
-            </a:r>
-          </a:p>
-          <a:p>
-            <a:pPr marL="0" indent="0">
-              <a:buNone/>
-            </a:pPr>
-            <a:r>
-              <a:rPr lang="en-US" sz="1400" dirty="0">
-                <a:latin typeface="Courier New" panose="02070309020205020404" pitchFamily="49" charset="0"/>
-                <a:cs typeface="Courier New" panose="02070309020205020404" pitchFamily="49" charset="0"/>
-              </a:rPr>
-              <a:t> </a:t>
-            </a:r>
-          </a:p>
-          <a:p>
-            <a:pPr marL="0" indent="0">
-              <a:buNone/>
-            </a:pPr>
-            <a:r>
-              <a:rPr lang="en-US" sz="1400" dirty="0">
-                <a:latin typeface="Courier New" panose="02070309020205020404" pitchFamily="49" charset="0"/>
-                <a:cs typeface="Courier New" panose="02070309020205020404" pitchFamily="49" charset="0"/>
-              </a:rPr>
-              <a:t>public interface Aromatic{</a:t>
-            </a:r>
-          </a:p>
-          <a:p>
-            <a:pPr marL="0" indent="0">
-              <a:buNone/>
-            </a:pPr>
-            <a:r>
-              <a:rPr lang="en-US" sz="1400" dirty="0">
-                <a:latin typeface="Courier New" panose="02070309020205020404" pitchFamily="49" charset="0"/>
-                <a:cs typeface="Courier New" panose="02070309020205020404" pitchFamily="49" charset="0"/>
-              </a:rPr>
-              <a:t>	String </a:t>
-            </a:r>
-            <a:r>
-              <a:rPr lang="en-US" sz="1400" dirty="0" err="1">
-                <a:latin typeface="Courier New" panose="02070309020205020404" pitchFamily="49" charset="0"/>
-                <a:cs typeface="Courier New" panose="02070309020205020404" pitchFamily="49" charset="0"/>
-              </a:rPr>
-              <a:t>describeAroma</a:t>
-            </a:r>
-            <a:r>
-              <a:rPr lang="en-US" sz="1400" dirty="0">
-                <a:latin typeface="Courier New" panose="02070309020205020404" pitchFamily="49" charset="0"/>
-                <a:cs typeface="Courier New" panose="02070309020205020404" pitchFamily="49" charset="0"/>
-              </a:rPr>
-              <a:t>();  		</a:t>
-            </a:r>
-            <a:r>
-              <a:rPr lang="en-US" sz="1400" dirty="0">
-                <a:latin typeface="Courier New" panose="02070309020205020404" pitchFamily="49" charset="0"/>
-                <a:cs typeface="Courier New" panose="02070309020205020404" pitchFamily="49" charset="0"/>
-                <a:sym typeface="Wingdings" panose="05000000000000000000" pitchFamily="2" charset="2"/>
-              </a:rPr>
-              <a:t></a:t>
-            </a:r>
-            <a:r>
-              <a:rPr lang="en-US" sz="1400" dirty="0">
-                <a:latin typeface="Courier New" panose="02070309020205020404" pitchFamily="49" charset="0"/>
-                <a:cs typeface="Courier New" panose="02070309020205020404" pitchFamily="49" charset="0"/>
-              </a:rPr>
-              <a:t> Notice the lack of “public”! Public is </a:t>
-            </a:r>
-            <a:r>
-              <a:rPr lang="en-US" sz="1400" i="1" dirty="0">
-                <a:latin typeface="Courier New" panose="02070309020205020404" pitchFamily="49" charset="0"/>
-                <a:cs typeface="Courier New" panose="02070309020205020404" pitchFamily="49" charset="0"/>
-              </a:rPr>
-              <a:t>assumed</a:t>
-            </a:r>
-            <a:r>
-              <a:rPr lang="en-US" sz="1400" dirty="0">
-                <a:latin typeface="Courier New" panose="02070309020205020404" pitchFamily="49" charset="0"/>
-                <a:cs typeface="Courier New" panose="02070309020205020404" pitchFamily="49" charset="0"/>
-              </a:rPr>
-              <a:t>.</a:t>
-            </a:r>
-          </a:p>
-          <a:p>
-            <a:pPr marL="0" indent="0">
-              <a:buNone/>
-            </a:pPr>
-            <a:r>
-              <a:rPr lang="en-US" sz="1400" dirty="0">
-                <a:latin typeface="Courier New" panose="02070309020205020404" pitchFamily="49" charset="0"/>
-                <a:cs typeface="Courier New" panose="02070309020205020404" pitchFamily="49" charset="0"/>
-              </a:rPr>
-              <a:t>}</a:t>
-            </a:r>
-          </a:p>
-          <a:p>
-            <a:pPr marL="0" indent="0">
-              <a:buNone/>
-            </a:pPr>
-            <a:r>
-              <a:rPr lang="en-US" sz="1400" dirty="0">
-                <a:latin typeface="Courier New" panose="02070309020205020404" pitchFamily="49" charset="0"/>
-                <a:cs typeface="Courier New" panose="02070309020205020404" pitchFamily="49" charset="0"/>
-              </a:rPr>
-              <a:t> </a:t>
-            </a:r>
-          </a:p>
-          <a:p>
-            <a:pPr marL="0" indent="0">
-              <a:buNone/>
-            </a:pPr>
-            <a:r>
-              <a:rPr lang="en-US" sz="1400" dirty="0">
-                <a:latin typeface="Courier New" panose="02070309020205020404" pitchFamily="49" charset="0"/>
-                <a:cs typeface="Courier New" panose="02070309020205020404" pitchFamily="49" charset="0"/>
-              </a:rPr>
-              <a:t>public interface Greasy{</a:t>
-            </a:r>
-          </a:p>
-          <a:p>
-            <a:pPr marL="0" indent="0">
-              <a:buNone/>
-            </a:pPr>
-            <a:r>
-              <a:rPr lang="en-US" sz="1400" dirty="0">
-                <a:latin typeface="Courier New" panose="02070309020205020404" pitchFamily="49" charset="0"/>
-                <a:cs typeface="Courier New" panose="02070309020205020404" pitchFamily="49" charset="0"/>
-              </a:rPr>
-              <a:t>	double </a:t>
-            </a:r>
-            <a:r>
-              <a:rPr lang="en-US" sz="1400" dirty="0" err="1">
-                <a:latin typeface="Courier New" panose="02070309020205020404" pitchFamily="49" charset="0"/>
-                <a:cs typeface="Courier New" panose="02070309020205020404" pitchFamily="49" charset="0"/>
-              </a:rPr>
-              <a:t>amountOfGreaseInMg</a:t>
-            </a:r>
-            <a:r>
-              <a:rPr lang="en-US" sz="1400" dirty="0">
-                <a:latin typeface="Courier New" panose="02070309020205020404" pitchFamily="49" charset="0"/>
-                <a:cs typeface="Courier New" panose="02070309020205020404" pitchFamily="49" charset="0"/>
-              </a:rPr>
-              <a:t>();   	</a:t>
-            </a:r>
-            <a:r>
-              <a:rPr lang="en-US" sz="1400" dirty="0">
-                <a:latin typeface="Courier New" panose="02070309020205020404" pitchFamily="49" charset="0"/>
-                <a:cs typeface="Courier New" panose="02070309020205020404" pitchFamily="49" charset="0"/>
-                <a:sym typeface="Wingdings" panose="05000000000000000000" pitchFamily="2" charset="2"/>
-              </a:rPr>
-              <a:t></a:t>
-            </a:r>
-            <a:r>
-              <a:rPr lang="en-US" sz="1400" dirty="0">
-                <a:latin typeface="Courier New" panose="02070309020205020404" pitchFamily="49" charset="0"/>
-                <a:cs typeface="Courier New" panose="02070309020205020404" pitchFamily="49" charset="0"/>
-              </a:rPr>
-              <a:t>point out that interfaces look just like classes</a:t>
-            </a:r>
-          </a:p>
-          <a:p>
-            <a:pPr marL="0" indent="0">
-              <a:buNone/>
-            </a:pPr>
-            <a:r>
-              <a:rPr lang="en-US" sz="1400" dirty="0">
-                <a:latin typeface="Courier New" panose="02070309020205020404" pitchFamily="49" charset="0"/>
-                <a:cs typeface="Courier New" panose="02070309020205020404" pitchFamily="49" charset="0"/>
-              </a:rPr>
-              <a:t>}					but without fields or method bodies</a:t>
-            </a:r>
-          </a:p>
-          <a:p>
-            <a:pPr marL="0" indent="0">
-              <a:buNone/>
-            </a:pPr>
-            <a:r>
-              <a:rPr lang="en-US" sz="1400" dirty="0">
-                <a:latin typeface="Courier New" panose="02070309020205020404" pitchFamily="49" charset="0"/>
-                <a:cs typeface="Courier New" panose="02070309020205020404" pitchFamily="49" charset="0"/>
-              </a:rPr>
-              <a:t> </a:t>
-            </a:r>
-          </a:p>
-          <a:p>
-            <a:pPr marL="0" indent="0">
-              <a:buNone/>
-            </a:pPr>
-            <a:r>
-              <a:rPr lang="en-US" sz="1400" dirty="0">
-                <a:latin typeface="Courier New" panose="02070309020205020404" pitchFamily="49" charset="0"/>
-                <a:cs typeface="Courier New" panose="02070309020205020404" pitchFamily="49" charset="0"/>
-              </a:rPr>
-              <a:t>public interface Edible{</a:t>
-            </a:r>
-          </a:p>
-          <a:p>
-            <a:pPr marL="0" indent="0">
-              <a:buNone/>
-            </a:pPr>
-            <a:r>
-              <a:rPr lang="en-US" sz="1400" dirty="0">
-                <a:latin typeface="Courier New" panose="02070309020205020404" pitchFamily="49" charset="0"/>
-                <a:cs typeface="Courier New" panose="02070309020205020404" pitchFamily="49" charset="0"/>
-              </a:rPr>
-              <a:t>	double calories();</a:t>
-            </a:r>
-          </a:p>
-          <a:p>
-            <a:pPr marL="0" indent="0">
-              <a:buNone/>
-            </a:pPr>
-            <a:r>
-              <a:rPr lang="en-US" sz="1400" dirty="0">
-                <a:latin typeface="Courier New" panose="02070309020205020404" pitchFamily="49" charset="0"/>
-                <a:cs typeface="Courier New" panose="02070309020205020404" pitchFamily="49" charset="0"/>
-              </a:rPr>
-              <a:t>}</a:t>
-            </a:r>
-          </a:p>
-        </p:txBody>
-      </p:sp>
-    </p:spTree>
-    <p:extLst>
-      <p:ext uri="{BB962C8B-B14F-4D97-AF65-F5344CB8AC3E}">
-        <p14:creationId xmlns:p14="http://schemas.microsoft.com/office/powerpoint/2010/main" val="3474555343"/>
-      </p:ext>
-    </p:extLst>
-  </p:cSld>
-  <p:clrMapOvr>
-    <a:masterClrMapping/>
-  </p:clrMapOvr>
-</p:sld>
-</file>
-
 <file path=ppt/slides/slide8.xml><?xml version="1.0" encoding="utf-8"?>
 <p:sld xmlns:a="http://schemas.openxmlformats.org/drawingml/2006/main" xmlns:r="http://schemas.openxmlformats.org/officeDocument/2006/relationships" xmlns:p="http://schemas.openxmlformats.org/presentationml/2006/main">
   <p:cSld>
@@ -31569,7 +31398,7 @@
           <a:p>
             <a:r>
               <a:rPr lang="en-US" dirty="0"/>
-              <a:t>Implementing Interfaces</a:t>
+              <a:t>Declaring Interfaces</a:t>
             </a:r>
           </a:p>
         </p:txBody>
@@ -31584,15 +31413,10 @@
             <p:ph idx="1"/>
           </p:nvPr>
         </p:nvSpPr>
-        <p:spPr>
-          <a:xfrm>
-            <a:off x="838199" y="1825625"/>
-            <a:ext cx="10660529" cy="4351338"/>
-          </a:xfrm>
-        </p:spPr>
+        <p:spPr/>
         <p:txBody>
           <a:bodyPr>
-            <a:normAutofit/>
+            <a:normAutofit fontScale="92500" lnSpcReduction="10000"/>
           </a:bodyPr>
           <a:lstStyle/>
           <a:p>
@@ -31600,11 +31424,11 @@
               <a:buNone/>
             </a:pPr>
             <a:r>
-              <a:rPr lang="en-US" sz="1800" dirty="0">
-                <a:latin typeface="Courier New" panose="02070309020205020404" pitchFamily="49" charset="0"/>
-                <a:cs typeface="Courier New" panose="02070309020205020404" pitchFamily="49" charset="0"/>
-              </a:rPr>
-              <a:t>public class Bacon extends Pork implements Salty, Aromatic, Greasy, Edible {</a:t>
+              <a:rPr lang="en-US" sz="1400" dirty="0">
+                <a:latin typeface="Courier New" panose="02070309020205020404" pitchFamily="49" charset="0"/>
+                <a:cs typeface="Courier New" panose="02070309020205020404" pitchFamily="49" charset="0"/>
+              </a:rPr>
+              <a:t>public interface Salty{</a:t>
             </a:r>
           </a:p>
           <a:p>
@@ -31612,46 +31436,78 @@
               <a:buNone/>
             </a:pPr>
             <a:r>
-              <a:rPr lang="en-US" sz="1800" dirty="0">
-                <a:latin typeface="Courier New" panose="02070309020205020404" pitchFamily="49" charset="0"/>
-                <a:cs typeface="Courier New" panose="02070309020205020404" pitchFamily="49" charset="0"/>
-              </a:rPr>
-              <a:t>	private double </a:t>
-            </a:r>
-            <a:r>
-              <a:rPr lang="en-US" sz="1800" dirty="0" err="1">
-                <a:latin typeface="Courier New" panose="02070309020205020404" pitchFamily="49" charset="0"/>
-                <a:cs typeface="Courier New" panose="02070309020205020404" pitchFamily="49" charset="0"/>
-              </a:rPr>
-              <a:t>amountInKg</a:t>
-            </a:r>
-            <a:r>
-              <a:rPr lang="en-US" sz="1800" dirty="0">
-                <a:latin typeface="Courier New" panose="02070309020205020404" pitchFamily="49" charset="0"/>
-                <a:cs typeface="Courier New" panose="02070309020205020404" pitchFamily="49" charset="0"/>
-              </a:rPr>
-              <a:t>;</a:t>
+              <a:rPr lang="en-US" sz="1400" dirty="0">
+                <a:latin typeface="Courier New" panose="02070309020205020404" pitchFamily="49" charset="0"/>
+                <a:cs typeface="Courier New" panose="02070309020205020404" pitchFamily="49" charset="0"/>
+              </a:rPr>
+              <a:t>	double </a:t>
+            </a:r>
+            <a:r>
+              <a:rPr lang="en-US" sz="1400" dirty="0" err="1">
+                <a:latin typeface="Courier New" panose="02070309020205020404" pitchFamily="49" charset="0"/>
+                <a:cs typeface="Courier New" panose="02070309020205020404" pitchFamily="49" charset="0"/>
+              </a:rPr>
+              <a:t>sodiumContent</a:t>
+            </a:r>
+            <a:r>
+              <a:rPr lang="en-US" sz="1400" dirty="0">
+                <a:latin typeface="Courier New" panose="02070309020205020404" pitchFamily="49" charset="0"/>
+                <a:cs typeface="Courier New" panose="02070309020205020404" pitchFamily="49" charset="0"/>
+              </a:rPr>
+              <a:t>();      	</a:t>
+            </a:r>
+            <a:r>
+              <a:rPr lang="en-US" sz="1400" dirty="0">
+                <a:latin typeface="Courier New" panose="02070309020205020404" pitchFamily="49" charset="0"/>
+                <a:cs typeface="Courier New" panose="02070309020205020404" pitchFamily="49" charset="0"/>
+                <a:sym typeface="Wingdings" panose="05000000000000000000" pitchFamily="2" charset="2"/>
+              </a:rPr>
+              <a:t></a:t>
+            </a:r>
+            <a:r>
+              <a:rPr lang="en-US" sz="1400" dirty="0">
+                <a:latin typeface="Courier New" panose="02070309020205020404" pitchFamily="49" charset="0"/>
+                <a:cs typeface="Courier New" panose="02070309020205020404" pitchFamily="49" charset="0"/>
+              </a:rPr>
+              <a:t>this is a promise to implement the </a:t>
+            </a:r>
+            <a:r>
+              <a:rPr lang="en-US" sz="1400" dirty="0" err="1">
+                <a:latin typeface="Courier New" panose="02070309020205020404" pitchFamily="49" charset="0"/>
+                <a:cs typeface="Courier New" panose="02070309020205020404" pitchFamily="49" charset="0"/>
+              </a:rPr>
+              <a:t>sodiumContent</a:t>
+            </a:r>
+            <a:r>
+              <a:rPr lang="en-US" sz="1400" dirty="0">
+                <a:latin typeface="Courier New" panose="02070309020205020404" pitchFamily="49" charset="0"/>
+                <a:cs typeface="Courier New" panose="02070309020205020404" pitchFamily="49" charset="0"/>
+              </a:rPr>
+              <a:t> </a:t>
             </a:r>
           </a:p>
           <a:p>
             <a:pPr marL="0" indent="0">
               <a:buNone/>
             </a:pPr>
-            <a:endParaRPr lang="en-US" sz="1800" dirty="0">
-              <a:latin typeface="Courier New" panose="02070309020205020404" pitchFamily="49" charset="0"/>
-              <a:cs typeface="Courier New" panose="02070309020205020404" pitchFamily="49" charset="0"/>
-            </a:endParaRPr>
+            <a:r>
+              <a:rPr lang="en-US" sz="1400" dirty="0">
+                <a:latin typeface="Courier New" panose="02070309020205020404" pitchFamily="49" charset="0"/>
+                <a:cs typeface="Courier New" panose="02070309020205020404" pitchFamily="49" charset="0"/>
+              </a:rPr>
+              <a:t>}				 	in the class that implements the Salty interface.</a:t>
+            </a:r>
           </a:p>
           <a:p>
             <a:pPr marL="0" indent="0">
               <a:buNone/>
             </a:pPr>
             <a:r>
-              <a:rPr lang="en-US" sz="1800" dirty="0">
-                <a:latin typeface="Courier New" panose="02070309020205020404" pitchFamily="49" charset="0"/>
-                <a:cs typeface="Courier New" panose="02070309020205020404" pitchFamily="49" charset="0"/>
-              </a:rPr>
-              <a:t>	public Bacon(double amount){</a:t>
+              <a:rPr lang="en-US" sz="1400" dirty="0">
+                <a:latin typeface="Courier New" panose="02070309020205020404" pitchFamily="49" charset="0"/>
+                <a:cs typeface="Courier New" panose="02070309020205020404" pitchFamily="49" charset="0"/>
+              </a:rPr>
+              <a:t> </a:t>
             </a:r>
           </a:p>
           <a:p>
@@ -31659,25 +31515,11 @@
               <a:buNone/>
             </a:pPr>
             <a:r>
-              <a:rPr lang="en-US" sz="1800" dirty="0">
-                <a:latin typeface="Courier New" panose="02070309020205020404" pitchFamily="49" charset="0"/>
-                <a:cs typeface="Courier New" panose="02070309020205020404" pitchFamily="49" charset="0"/>
-              </a:rPr>
-              <a:t>		</a:t>
-            </a:r>
-            <a:r>
-              <a:rPr lang="en-US" sz="1800" dirty="0" err="1">
-                <a:latin typeface="Courier New" panose="02070309020205020404" pitchFamily="49" charset="0"/>
-                <a:cs typeface="Courier New" panose="02070309020205020404" pitchFamily="49" charset="0"/>
-              </a:rPr>
-              <a:t>amountInKg</a:t>
-            </a:r>
-            <a:r>
-              <a:rPr lang="en-US" sz="1800" dirty="0">
-                <a:latin typeface="Courier New" panose="02070309020205020404" pitchFamily="49" charset="0"/>
-                <a:cs typeface="Courier New" panose="02070309020205020404" pitchFamily="49" charset="0"/>
-              </a:rPr>
-              <a:t> = amount;</a:t>
+              <a:rPr lang="en-US" sz="1400" dirty="0">
+                <a:latin typeface="Courier New" panose="02070309020205020404" pitchFamily="49" charset="0"/>
+                <a:cs typeface="Courier New" panose="02070309020205020404" pitchFamily="49" charset="0"/>
+              </a:rPr>
+              <a:t>public interface Aromatic{</a:t>
             </a:r>
           </a:p>
           <a:p>
@@ -31685,32 +31527,78 @@
               <a:buNone/>
             </a:pPr>
             <a:r>
-              <a:rPr lang="en-US" sz="1800" dirty="0">
-                <a:latin typeface="Courier New" panose="02070309020205020404" pitchFamily="49" charset="0"/>
-                <a:cs typeface="Courier New" panose="02070309020205020404" pitchFamily="49" charset="0"/>
-              </a:rPr>
-              <a:t>	}</a:t>
+              <a:rPr lang="en-US" sz="1400" dirty="0">
+                <a:latin typeface="Courier New" panose="02070309020205020404" pitchFamily="49" charset="0"/>
+                <a:cs typeface="Courier New" panose="02070309020205020404" pitchFamily="49" charset="0"/>
+              </a:rPr>
+              <a:t>	String </a:t>
+            </a:r>
+            <a:r>
+              <a:rPr lang="en-US" sz="1400" dirty="0" err="1">
+                <a:latin typeface="Courier New" panose="02070309020205020404" pitchFamily="49" charset="0"/>
+                <a:cs typeface="Courier New" panose="02070309020205020404" pitchFamily="49" charset="0"/>
+              </a:rPr>
+              <a:t>describeAroma</a:t>
+            </a:r>
+            <a:r>
+              <a:rPr lang="en-US" sz="1400" dirty="0">
+                <a:latin typeface="Courier New" panose="02070309020205020404" pitchFamily="49" charset="0"/>
+                <a:cs typeface="Courier New" panose="02070309020205020404" pitchFamily="49" charset="0"/>
+              </a:rPr>
+              <a:t>();  		</a:t>
+            </a:r>
+            <a:r>
+              <a:rPr lang="en-US" sz="1400" dirty="0">
+                <a:latin typeface="Courier New" panose="02070309020205020404" pitchFamily="49" charset="0"/>
+                <a:cs typeface="Courier New" panose="02070309020205020404" pitchFamily="49" charset="0"/>
+                <a:sym typeface="Wingdings" panose="05000000000000000000" pitchFamily="2" charset="2"/>
+              </a:rPr>
+              <a:t></a:t>
+            </a:r>
+            <a:r>
+              <a:rPr lang="en-US" sz="1400" dirty="0">
+                <a:latin typeface="Courier New" panose="02070309020205020404" pitchFamily="49" charset="0"/>
+                <a:cs typeface="Courier New" panose="02070309020205020404" pitchFamily="49" charset="0"/>
+              </a:rPr>
+              <a:t> Notice the lack of “public”! Public is </a:t>
+            </a:r>
+            <a:r>
+              <a:rPr lang="en-US" sz="1400" i="1" dirty="0">
+                <a:latin typeface="Courier New" panose="02070309020205020404" pitchFamily="49" charset="0"/>
+                <a:cs typeface="Courier New" panose="02070309020205020404" pitchFamily="49" charset="0"/>
+              </a:rPr>
+              <a:t>assumed</a:t>
+            </a:r>
+            <a:r>
+              <a:rPr lang="en-US" sz="1400" dirty="0">
+                <a:latin typeface="Courier New" panose="02070309020205020404" pitchFamily="49" charset="0"/>
+                <a:cs typeface="Courier New" panose="02070309020205020404" pitchFamily="49" charset="0"/>
+              </a:rPr>
+              <a:t>.</a:t>
             </a:r>
           </a:p>
           <a:p>
             <a:pPr marL="0" indent="0">
               <a:buNone/>
             </a:pPr>
-            <a:endParaRPr lang="en-US" sz="1800" dirty="0">
-              <a:latin typeface="Courier New" panose="02070309020205020404" pitchFamily="49" charset="0"/>
-              <a:cs typeface="Courier New" panose="02070309020205020404" pitchFamily="49" charset="0"/>
-            </a:endParaRPr>
+            <a:r>
+              <a:rPr lang="en-US" sz="1400" dirty="0">
+                <a:latin typeface="Courier New" panose="02070309020205020404" pitchFamily="49" charset="0"/>
+                <a:cs typeface="Courier New" panose="02070309020205020404" pitchFamily="49" charset="0"/>
+              </a:rPr>
+              <a:t>}</a:t>
+            </a:r>
           </a:p>
           <a:p>
             <a:pPr marL="0" indent="0">
               <a:buNone/>
             </a:pPr>
             <a:r>
-              <a:rPr lang="en-US" sz="1800" dirty="0">
-                <a:latin typeface="Courier New" panose="02070309020205020404" pitchFamily="49" charset="0"/>
-                <a:cs typeface="Courier New" panose="02070309020205020404" pitchFamily="49" charset="0"/>
-              </a:rPr>
-              <a:t> 	public double calories(){</a:t>
+              <a:rPr lang="en-US" sz="1400" dirty="0">
+                <a:latin typeface="Courier New" panose="02070309020205020404" pitchFamily="49" charset="0"/>
+                <a:cs typeface="Courier New" panose="02070309020205020404" pitchFamily="49" charset="0"/>
+              </a:rPr>
+              <a:t> </a:t>
             </a:r>
           </a:p>
           <a:p>
@@ -31718,25 +31606,11 @@
               <a:buNone/>
             </a:pPr>
             <a:r>
-              <a:rPr lang="en-US" sz="1800" dirty="0">
-                <a:latin typeface="Courier New" panose="02070309020205020404" pitchFamily="49" charset="0"/>
-                <a:cs typeface="Courier New" panose="02070309020205020404" pitchFamily="49" charset="0"/>
-              </a:rPr>
-              <a:t>		return </a:t>
-            </a:r>
-            <a:r>
-              <a:rPr lang="en-US" sz="1800" dirty="0" err="1">
-                <a:latin typeface="Courier New" panose="02070309020205020404" pitchFamily="49" charset="0"/>
-                <a:cs typeface="Courier New" panose="02070309020205020404" pitchFamily="49" charset="0"/>
-              </a:rPr>
-              <a:t>amountInKg</a:t>
-            </a:r>
-            <a:r>
-              <a:rPr lang="en-US" sz="1800" dirty="0">
-                <a:latin typeface="Courier New" panose="02070309020205020404" pitchFamily="49" charset="0"/>
-                <a:cs typeface="Courier New" panose="02070309020205020404" pitchFamily="49" charset="0"/>
-              </a:rPr>
-              <a:t> * CALORIES_PER_KG_OF_BACON;</a:t>
+              <a:rPr lang="en-US" sz="1400" dirty="0">
+                <a:latin typeface="Courier New" panose="02070309020205020404" pitchFamily="49" charset="0"/>
+                <a:cs typeface="Courier New" panose="02070309020205020404" pitchFamily="49" charset="0"/>
+              </a:rPr>
+              <a:t>public interface Greasy{</a:t>
             </a:r>
           </a:p>
           <a:p>
@@ -31744,11 +31618,40 @@
               <a:buNone/>
             </a:pPr>
             <a:r>
-              <a:rPr lang="en-US" sz="1800" dirty="0">
-                <a:latin typeface="Courier New" panose="02070309020205020404" pitchFamily="49" charset="0"/>
-                <a:cs typeface="Courier New" panose="02070309020205020404" pitchFamily="49" charset="0"/>
-              </a:rPr>
-              <a:t>	}</a:t>
+              <a:rPr lang="en-US" sz="1400" dirty="0">
+                <a:latin typeface="Courier New" panose="02070309020205020404" pitchFamily="49" charset="0"/>
+                <a:cs typeface="Courier New" panose="02070309020205020404" pitchFamily="49" charset="0"/>
+              </a:rPr>
+              <a:t>	double </a:t>
+            </a:r>
+            <a:r>
+              <a:rPr lang="en-US" sz="1400" dirty="0" err="1">
+                <a:latin typeface="Courier New" panose="02070309020205020404" pitchFamily="49" charset="0"/>
+                <a:cs typeface="Courier New" panose="02070309020205020404" pitchFamily="49" charset="0"/>
+              </a:rPr>
+              <a:t>amountOfGreaseInMg</a:t>
+            </a:r>
+            <a:r>
+              <a:rPr lang="en-US" sz="1400" dirty="0">
+                <a:latin typeface="Courier New" panose="02070309020205020404" pitchFamily="49" charset="0"/>
+                <a:cs typeface="Courier New" panose="02070309020205020404" pitchFamily="49" charset="0"/>
+              </a:rPr>
+              <a:t>();   	</a:t>
+            </a:r>
+            <a:r>
+              <a:rPr lang="en-US" sz="1400" dirty="0">
+                <a:latin typeface="Courier New" panose="02070309020205020404" pitchFamily="49" charset="0"/>
+                <a:cs typeface="Courier New" panose="02070309020205020404" pitchFamily="49" charset="0"/>
+                <a:sym typeface="Wingdings" panose="05000000000000000000" pitchFamily="2" charset="2"/>
+              </a:rPr>
+              <a:t></a:t>
+            </a:r>
+            <a:r>
+              <a:rPr lang="en-US" sz="1400" dirty="0">
+                <a:latin typeface="Courier New" panose="02070309020205020404" pitchFamily="49" charset="0"/>
+                <a:cs typeface="Courier New" panose="02070309020205020404" pitchFamily="49" charset="0"/>
+              </a:rPr>
+              <a:t>point out that interfaces look just like classes</a:t>
             </a:r>
           </a:p>
           <a:p>
@@ -31756,7 +31659,55 @@
               <a:buNone/>
             </a:pPr>
             <a:r>
-              <a:rPr lang="en-US" sz="1800" dirty="0">
+              <a:rPr lang="en-US" sz="1400" dirty="0">
+                <a:latin typeface="Courier New" panose="02070309020205020404" pitchFamily="49" charset="0"/>
+                <a:cs typeface="Courier New" panose="02070309020205020404" pitchFamily="49" charset="0"/>
+              </a:rPr>
+              <a:t>}					but without fields or method bodies</a:t>
+            </a:r>
+          </a:p>
+          <a:p>
+            <a:pPr marL="0" indent="0">
+              <a:buNone/>
+            </a:pPr>
+            <a:r>
+              <a:rPr lang="en-US" sz="1400" dirty="0">
+                <a:latin typeface="Courier New" panose="02070309020205020404" pitchFamily="49" charset="0"/>
+                <a:cs typeface="Courier New" panose="02070309020205020404" pitchFamily="49" charset="0"/>
+              </a:rPr>
+              <a:t> </a:t>
+            </a:r>
+          </a:p>
+          <a:p>
+            <a:pPr marL="0" indent="0">
+              <a:buNone/>
+            </a:pPr>
+            <a:r>
+              <a:rPr lang="en-US" sz="1400" dirty="0">
+                <a:latin typeface="Courier New" panose="02070309020205020404" pitchFamily="49" charset="0"/>
+                <a:cs typeface="Courier New" panose="02070309020205020404" pitchFamily="49" charset="0"/>
+              </a:rPr>
+              <a:t>public interface Edible{</a:t>
+            </a:r>
+          </a:p>
+          <a:p>
+            <a:pPr marL="0" indent="0">
+              <a:buNone/>
+            </a:pPr>
+            <a:r>
+              <a:rPr lang="en-US" sz="1400" dirty="0">
+                <a:latin typeface="Courier New" panose="02070309020205020404" pitchFamily="49" charset="0"/>
+                <a:cs typeface="Courier New" panose="02070309020205020404" pitchFamily="49" charset="0"/>
+              </a:rPr>
+              <a:t>	double calories();</a:t>
+            </a:r>
+          </a:p>
+          <a:p>
+            <a:pPr marL="0" indent="0">
+              <a:buNone/>
+            </a:pPr>
+            <a:r>
+              <a:rPr lang="en-US" sz="1400" dirty="0">
                 <a:latin typeface="Courier New" panose="02070309020205020404" pitchFamily="49" charset="0"/>
                 <a:cs typeface="Courier New" panose="02070309020205020404" pitchFamily="49" charset="0"/>
               </a:rPr>
@@ -31768,7 +31719,7 @@
     </p:spTree>
     <p:extLst>
       <p:ext uri="{BB962C8B-B14F-4D97-AF65-F5344CB8AC3E}">
-        <p14:creationId xmlns:p14="http://schemas.microsoft.com/office/powerpoint/2010/main" val="1094721936"/>
+        <p14:creationId xmlns:p14="http://schemas.microsoft.com/office/powerpoint/2010/main" val="3474555343"/>
       </p:ext>
     </p:extLst>
   </p:cSld>
@@ -31812,7 +31763,7 @@
           <a:p>
             <a:r>
               <a:rPr lang="en-US" dirty="0"/>
-              <a:t>Class Activity</a:t>
+              <a:t>Implementing Interfaces</a:t>
             </a:r>
           </a:p>
         </p:txBody>
@@ -31827,17 +31778,183 @@
             <p:ph idx="1"/>
           </p:nvPr>
         </p:nvSpPr>
-        <p:spPr/>
+        <p:spPr>
+          <a:xfrm>
+            <a:off x="838199" y="1825625"/>
+            <a:ext cx="10660529" cy="4351338"/>
+          </a:xfrm>
+        </p:spPr>
         <p:txBody>
-          <a:bodyPr/>
+          <a:bodyPr>
+            <a:normAutofit/>
+          </a:bodyPr>
           <a:lstStyle/>
           <a:p>
             <a:pPr marL="0" indent="0">
               <a:buNone/>
             </a:pPr>
             <a:r>
-              <a:rPr lang="en-US" dirty="0"/>
-              <a:t>[Paste example activity or your own from lesson plan to slide]</a:t>
+              <a:rPr lang="en-US" sz="1800" dirty="0">
+                <a:latin typeface="Courier New" panose="02070309020205020404" pitchFamily="49" charset="0"/>
+                <a:cs typeface="Courier New" panose="02070309020205020404" pitchFamily="49" charset="0"/>
+              </a:rPr>
+              <a:t>public class Bacon extends Pork implements Salty, Aromatic, Greasy, Edible {</a:t>
+            </a:r>
+          </a:p>
+          <a:p>
+            <a:pPr marL="0" indent="0">
+              <a:buNone/>
+            </a:pPr>
+            <a:r>
+              <a:rPr lang="en-US" sz="1800" dirty="0">
+                <a:latin typeface="Courier New" panose="02070309020205020404" pitchFamily="49" charset="0"/>
+                <a:cs typeface="Courier New" panose="02070309020205020404" pitchFamily="49" charset="0"/>
+              </a:rPr>
+              <a:t>	private double </a:t>
+            </a:r>
+            <a:r>
+              <a:rPr lang="en-US" sz="1800" dirty="0" err="1">
+                <a:latin typeface="Courier New" panose="02070309020205020404" pitchFamily="49" charset="0"/>
+                <a:cs typeface="Courier New" panose="02070309020205020404" pitchFamily="49" charset="0"/>
+              </a:rPr>
+              <a:t>amountInKg</a:t>
+            </a:r>
+            <a:r>
+              <a:rPr lang="en-US" sz="1800" dirty="0">
+                <a:latin typeface="Courier New" panose="02070309020205020404" pitchFamily="49" charset="0"/>
+                <a:cs typeface="Courier New" panose="02070309020205020404" pitchFamily="49" charset="0"/>
+              </a:rPr>
+              <a:t>;</a:t>
+            </a:r>
+          </a:p>
+          <a:p>
+            <a:pPr marL="0" indent="0">
+              <a:buNone/>
+            </a:pPr>
+            <a:endParaRPr lang="en-US" sz="1800" dirty="0">
+              <a:latin typeface="Courier New" panose="02070309020205020404" pitchFamily="49" charset="0"/>
+              <a:cs typeface="Courier New" panose="02070309020205020404" pitchFamily="49" charset="0"/>
+            </a:endParaRPr>
+          </a:p>
+          <a:p>
+            <a:pPr marL="0" indent="0">
+              <a:buNone/>
+            </a:pPr>
+            <a:r>
+              <a:rPr lang="en-US" sz="1800" dirty="0">
+                <a:latin typeface="Courier New" panose="02070309020205020404" pitchFamily="49" charset="0"/>
+                <a:cs typeface="Courier New" panose="02070309020205020404" pitchFamily="49" charset="0"/>
+              </a:rPr>
+              <a:t>	public Bacon(double amount){</a:t>
+            </a:r>
+          </a:p>
+          <a:p>
+            <a:pPr marL="0" indent="0">
+              <a:buNone/>
+            </a:pPr>
+            <a:r>
+              <a:rPr lang="en-US" sz="1800" dirty="0">
+                <a:latin typeface="Courier New" panose="02070309020205020404" pitchFamily="49" charset="0"/>
+                <a:cs typeface="Courier New" panose="02070309020205020404" pitchFamily="49" charset="0"/>
+              </a:rPr>
+              <a:t>		</a:t>
+            </a:r>
+            <a:r>
+              <a:rPr lang="en-US" sz="1800" dirty="0" err="1">
+                <a:latin typeface="Courier New" panose="02070309020205020404" pitchFamily="49" charset="0"/>
+                <a:cs typeface="Courier New" panose="02070309020205020404" pitchFamily="49" charset="0"/>
+              </a:rPr>
+              <a:t>amountInKg</a:t>
+            </a:r>
+            <a:r>
+              <a:rPr lang="en-US" sz="1800" dirty="0">
+                <a:latin typeface="Courier New" panose="02070309020205020404" pitchFamily="49" charset="0"/>
+                <a:cs typeface="Courier New" panose="02070309020205020404" pitchFamily="49" charset="0"/>
+              </a:rPr>
+              <a:t> = amount;</a:t>
+            </a:r>
+          </a:p>
+          <a:p>
+            <a:pPr marL="0" indent="0">
+              <a:buNone/>
+            </a:pPr>
+            <a:r>
+              <a:rPr lang="en-US" sz="1800" dirty="0">
+                <a:latin typeface="Courier New" panose="02070309020205020404" pitchFamily="49" charset="0"/>
+                <a:cs typeface="Courier New" panose="02070309020205020404" pitchFamily="49" charset="0"/>
+              </a:rPr>
+              <a:t>	}</a:t>
+            </a:r>
+          </a:p>
+          <a:p>
+            <a:pPr marL="0" indent="0">
+              <a:buNone/>
+            </a:pPr>
+            <a:endParaRPr lang="en-US" sz="1800" dirty="0">
+              <a:latin typeface="Courier New" panose="02070309020205020404" pitchFamily="49" charset="0"/>
+              <a:cs typeface="Courier New" panose="02070309020205020404" pitchFamily="49" charset="0"/>
+            </a:endParaRPr>
+          </a:p>
+          <a:p>
+            <a:pPr marL="0" indent="0">
+              <a:buNone/>
+            </a:pPr>
+            <a:r>
+              <a:rPr lang="en-US" sz="1800" dirty="0">
+                <a:latin typeface="Courier New" panose="02070309020205020404" pitchFamily="49" charset="0"/>
+                <a:cs typeface="Courier New" panose="02070309020205020404" pitchFamily="49" charset="0"/>
+              </a:rPr>
+              <a:t> 	public double calories(){</a:t>
+            </a:r>
+          </a:p>
+          <a:p>
+            <a:pPr marL="0" indent="0">
+              <a:buNone/>
+            </a:pPr>
+            <a:r>
+              <a:rPr lang="en-US" sz="1800" dirty="0">
+                <a:latin typeface="Courier New" panose="02070309020205020404" pitchFamily="49" charset="0"/>
+                <a:cs typeface="Courier New" panose="02070309020205020404" pitchFamily="49" charset="0"/>
+              </a:rPr>
+              <a:t>		return </a:t>
+            </a:r>
+            <a:r>
+              <a:rPr lang="en-US" sz="1800" dirty="0" err="1">
+                <a:latin typeface="Courier New" panose="02070309020205020404" pitchFamily="49" charset="0"/>
+                <a:cs typeface="Courier New" panose="02070309020205020404" pitchFamily="49" charset="0"/>
+              </a:rPr>
+              <a:t>amountInKg</a:t>
+            </a:r>
+            <a:r>
+              <a:rPr lang="en-US" sz="1800" dirty="0">
+                <a:latin typeface="Courier New" panose="02070309020205020404" pitchFamily="49" charset="0"/>
+                <a:cs typeface="Courier New" panose="02070309020205020404" pitchFamily="49" charset="0"/>
+              </a:rPr>
+              <a:t> * CALORIES_PER_KG_OF_BACON;</a:t>
+            </a:r>
+          </a:p>
+          <a:p>
+            <a:pPr marL="0" indent="0">
+              <a:buNone/>
+            </a:pPr>
+            <a:r>
+              <a:rPr lang="en-US" sz="1800" dirty="0">
+                <a:latin typeface="Courier New" panose="02070309020205020404" pitchFamily="49" charset="0"/>
+                <a:cs typeface="Courier New" panose="02070309020205020404" pitchFamily="49" charset="0"/>
+              </a:rPr>
+              <a:t>	}</a:t>
+            </a:r>
+          </a:p>
+          <a:p>
+            <a:pPr marL="0" indent="0">
+              <a:buNone/>
+            </a:pPr>
+            <a:r>
+              <a:rPr lang="en-US" sz="1800" dirty="0">
+                <a:latin typeface="Courier New" panose="02070309020205020404" pitchFamily="49" charset="0"/>
+                <a:cs typeface="Courier New" panose="02070309020205020404" pitchFamily="49" charset="0"/>
+              </a:rPr>
+              <a:t>}</a:t>
             </a:r>
           </a:p>
         </p:txBody>
@@ -31845,7 +31962,7 @@
     </p:spTree>
     <p:extLst>
       <p:ext uri="{BB962C8B-B14F-4D97-AF65-F5344CB8AC3E}">
-        <p14:creationId xmlns:p14="http://schemas.microsoft.com/office/powerpoint/2010/main" val="3514558618"/>
+        <p14:creationId xmlns:p14="http://schemas.microsoft.com/office/powerpoint/2010/main" val="1094721936"/>
       </p:ext>
     </p:extLst>
   </p:cSld>
@@ -31884,6 +32001,83 @@
         </p:nvSpPr>
         <p:spPr/>
         <p:txBody>
+          <a:bodyPr/>
+          <a:lstStyle/>
+          <a:p>
+            <a:r>
+              <a:rPr lang="en-US" dirty="0"/>
+              <a:t>Class Activity</a:t>
+            </a:r>
+          </a:p>
+        </p:txBody>
+      </p:sp>
+      <p:sp>
+        <p:nvSpPr>
+          <p:cNvPr id="3" name="Content Placeholder 2"/>
+          <p:cNvSpPr>
+            <a:spLocks noGrp="1"/>
+          </p:cNvSpPr>
+          <p:nvPr>
+            <p:ph idx="1"/>
+          </p:nvPr>
+        </p:nvSpPr>
+        <p:spPr/>
+        <p:txBody>
+          <a:bodyPr/>
+          <a:lstStyle/>
+          <a:p>
+            <a:pPr marL="0" indent="0">
+              <a:buNone/>
+            </a:pPr>
+            <a:r>
+              <a:rPr lang="en-US" dirty="0"/>
+              <a:t>[Paste example activity or your own from lesson plan to slide]</a:t>
+            </a:r>
+          </a:p>
+        </p:txBody>
+      </p:sp>
+    </p:spTree>
+    <p:extLst>
+      <p:ext uri="{BB962C8B-B14F-4D97-AF65-F5344CB8AC3E}">
+        <p14:creationId xmlns:p14="http://schemas.microsoft.com/office/powerpoint/2010/main" val="3514558618"/>
+      </p:ext>
+    </p:extLst>
+  </p:cSld>
+  <p:clrMapOvr>
+    <a:masterClrMapping/>
+  </p:clrMapOvr>
+</p:sld>
+</file>
+
+<file path=ppt/slides/slide83.xml><?xml version="1.0" encoding="utf-8"?>
+<p:sld xmlns:a="http://schemas.openxmlformats.org/drawingml/2006/main" xmlns:r="http://schemas.openxmlformats.org/officeDocument/2006/relationships" xmlns:p="http://schemas.openxmlformats.org/presentationml/2006/main">
+  <p:cSld>
+    <p:spTree>
+      <p:nvGrpSpPr>
+        <p:cNvPr id="1" name=""/>
+        <p:cNvGrpSpPr/>
+        <p:nvPr/>
+      </p:nvGrpSpPr>
+      <p:grpSpPr>
+        <a:xfrm>
+          <a:off x="0" y="0"/>
+          <a:ext cx="0" cy="0"/>
+          <a:chOff x="0" y="0"/>
+          <a:chExt cx="0" cy="0"/>
+        </a:xfrm>
+      </p:grpSpPr>
+      <p:sp>
+        <p:nvSpPr>
+          <p:cNvPr id="2" name="Title 1"/>
+          <p:cNvSpPr>
+            <a:spLocks noGrp="1"/>
+          </p:cNvSpPr>
+          <p:nvPr>
+            <p:ph type="title"/>
+          </p:nvPr>
+        </p:nvSpPr>
+        <p:spPr/>
+        <p:txBody>
           <a:bodyPr>
             <a:normAutofit/>
           </a:bodyPr>
@@ -31981,7 +32175,7 @@
 </p:sld>
 </file>
 
-<file path=ppt/slides/slide83.xml><?xml version="1.0" encoding="utf-8"?>
+<file path=ppt/slides/slide84.xml><?xml version="1.0" encoding="utf-8"?>
 <p:sld xmlns:a="http://schemas.openxmlformats.org/drawingml/2006/main" xmlns:r="http://schemas.openxmlformats.org/officeDocument/2006/relationships" xmlns:p="http://schemas.openxmlformats.org/presentationml/2006/main">
   <p:cSld>
     <p:spTree>
@@ -32065,7 +32259,7 @@
 </p:sld>
 </file>
 
-<file path=ppt/slides/slide84.xml><?xml version="1.0" encoding="utf-8"?>
+<file path=ppt/slides/slide85.xml><?xml version="1.0" encoding="utf-8"?>
 <p:sld xmlns:a="http://schemas.openxmlformats.org/drawingml/2006/main" xmlns:r="http://schemas.openxmlformats.org/officeDocument/2006/relationships" xmlns:p="http://schemas.openxmlformats.org/presentationml/2006/main">
   <p:cSld>
     <p:spTree>
@@ -32147,80 +32341,6 @@
     <p:extLst>
       <p:ext uri="{BB962C8B-B14F-4D97-AF65-F5344CB8AC3E}">
         <p14:creationId xmlns:p14="http://schemas.microsoft.com/office/powerpoint/2010/main" val="2163985506"/>
-      </p:ext>
-    </p:extLst>
-  </p:cSld>
-  <p:clrMapOvr>
-    <a:masterClrMapping/>
-  </p:clrMapOvr>
-</p:sld>
-</file>
-
-<file path=ppt/slides/slide85.xml><?xml version="1.0" encoding="utf-8"?>
-<p:sld xmlns:a="http://schemas.openxmlformats.org/drawingml/2006/main" xmlns:r="http://schemas.openxmlformats.org/officeDocument/2006/relationships" xmlns:p="http://schemas.openxmlformats.org/presentationml/2006/main">
-  <p:cSld>
-    <p:spTree>
-      <p:nvGrpSpPr>
-        <p:cNvPr id="1" name=""/>
-        <p:cNvGrpSpPr/>
-        <p:nvPr/>
-      </p:nvGrpSpPr>
-      <p:grpSpPr>
-        <a:xfrm>
-          <a:off x="0" y="0"/>
-          <a:ext cx="0" cy="0"/>
-          <a:chOff x="0" y="0"/>
-          <a:chExt cx="0" cy="0"/>
-        </a:xfrm>
-      </p:grpSpPr>
-      <p:sp>
-        <p:nvSpPr>
-          <p:cNvPr id="2" name="Title 1"/>
-          <p:cNvSpPr>
-            <a:spLocks noGrp="1"/>
-          </p:cNvSpPr>
-          <p:nvPr>
-            <p:ph type="ctrTitle"/>
-          </p:nvPr>
-        </p:nvSpPr>
-        <p:spPr/>
-        <p:txBody>
-          <a:bodyPr/>
-          <a:lstStyle/>
-          <a:p>
-            <a:r>
-              <a:rPr lang="en-US" dirty="0"/>
-              <a:t>Finding and Fixing Errors</a:t>
-            </a:r>
-          </a:p>
-        </p:txBody>
-      </p:sp>
-      <p:sp>
-        <p:nvSpPr>
-          <p:cNvPr id="3" name="Subtitle 2"/>
-          <p:cNvSpPr>
-            <a:spLocks noGrp="1"/>
-          </p:cNvSpPr>
-          <p:nvPr>
-            <p:ph type="subTitle" idx="1"/>
-          </p:nvPr>
-        </p:nvSpPr>
-        <p:spPr/>
-        <p:txBody>
-          <a:bodyPr/>
-          <a:lstStyle/>
-          <a:p>
-            <a:r>
-              <a:rPr lang="en-US" dirty="0"/>
-              <a:t>[ 6.08 ] [ Today’s Date ] [ Instructor Name ]</a:t>
-            </a:r>
-          </a:p>
-        </p:txBody>
-      </p:sp>
-    </p:spTree>
-    <p:extLst>
-      <p:ext uri="{BB962C8B-B14F-4D97-AF65-F5344CB8AC3E}">
-        <p14:creationId xmlns:p14="http://schemas.microsoft.com/office/powerpoint/2010/main" val="3786121268"/>
       </p:ext>
     </p:extLst>
   </p:cSld>
@@ -32254,7 +32374,7 @@
             <a:spLocks noGrp="1"/>
           </p:cNvSpPr>
           <p:nvPr>
-            <p:ph type="title"/>
+            <p:ph type="ctrTitle"/>
           </p:nvPr>
         </p:nvSpPr>
         <p:spPr/>
@@ -32264,19 +32384,19 @@
           <a:p>
             <a:r>
               <a:rPr lang="en-US" dirty="0"/>
-              <a:t>Today’s plan:</a:t>
+              <a:t>Finding and Fixing Errors</a:t>
             </a:r>
           </a:p>
         </p:txBody>
       </p:sp>
       <p:sp>
         <p:nvSpPr>
-          <p:cNvPr id="3" name="Content Placeholder 2"/>
+          <p:cNvPr id="3" name="Subtitle 2"/>
           <p:cNvSpPr>
             <a:spLocks noGrp="1"/>
           </p:cNvSpPr>
           <p:nvPr>
-            <p:ph idx="1"/>
+            <p:ph type="subTitle" idx="1"/>
           </p:nvPr>
         </p:nvSpPr>
         <p:spPr/>
@@ -32284,52 +32404,17 @@
           <a:bodyPr/>
           <a:lstStyle/>
           <a:p>
-            <a:pPr marL="0" indent="0">
-              <a:buNone/>
-            </a:pPr>
             <a:r>
               <a:rPr lang="en-US" dirty="0"/>
-              <a:t>Error check and resubmit all chapter 9 assignments.</a:t>
-            </a:r>
-          </a:p>
-          <a:p>
-            <a:endParaRPr lang="en-US" dirty="0"/>
-          </a:p>
-          <a:p>
-            <a:pPr marL="0" indent="0">
-              <a:buNone/>
-            </a:pPr>
-            <a:r>
-              <a:rPr lang="en-US" dirty="0"/>
-              <a:t>Study for the test by:</a:t>
-            </a:r>
-          </a:p>
-          <a:p>
-            <a:pPr lvl="1"/>
-            <a:r>
-              <a:rPr lang="en-US" dirty="0"/>
-              <a:t>Reviewing all of the blue, self-check pages at the end of Chapter 9.</a:t>
-            </a:r>
-          </a:p>
-          <a:p>
-            <a:pPr lvl="1"/>
-            <a:r>
-              <a:rPr lang="en-US" dirty="0"/>
-              <a:t>Re-reading sections as needed to complete the self-check problems.</a:t>
-            </a:r>
-          </a:p>
-          <a:p>
-            <a:pPr marL="457200" lvl="1" indent="0">
-              <a:buNone/>
-            </a:pPr>
-            <a:endParaRPr lang="en-US" dirty="0"/>
+              <a:t>[ 6.08 ] [ Today’s Date ] [ Instructor Name ]</a:t>
+            </a:r>
           </a:p>
         </p:txBody>
       </p:sp>
     </p:spTree>
     <p:extLst>
       <p:ext uri="{BB962C8B-B14F-4D97-AF65-F5344CB8AC3E}">
-        <p14:creationId xmlns:p14="http://schemas.microsoft.com/office/powerpoint/2010/main" val="3923898911"/>
+        <p14:creationId xmlns:p14="http://schemas.microsoft.com/office/powerpoint/2010/main" val="3786121268"/>
       </p:ext>
     </p:extLst>
   </p:cSld>
@@ -32373,7 +32458,7 @@
           <a:p>
             <a:r>
               <a:rPr lang="en-US" dirty="0"/>
-              <a:t>Homework Regrade/Resubmit</a:t>
+              <a:t>Today’s plan:</a:t>
             </a:r>
           </a:p>
         </p:txBody>
@@ -32398,7 +32483,7 @@
             </a:pPr>
             <a:r>
               <a:rPr lang="en-US" dirty="0"/>
-              <a:t>You all have the opportunity to get full credit  on your homework grades by correcting them now, in class.</a:t>
+              <a:t>Error check and resubmit all chapter 9 assignments.</a:t>
             </a:r>
           </a:p>
           <a:p>
@@ -32410,11 +32495,25 @@
             </a:pPr>
             <a:r>
               <a:rPr lang="en-US" dirty="0"/>
-              <a:t>Use your error checking algorithm, and if you need help just ask!</a:t>
-            </a:r>
-          </a:p>
-          <a:p>
-            <a:pPr marL="0" indent="0">
+              <a:t>Study for the test by:</a:t>
+            </a:r>
+          </a:p>
+          <a:p>
+            <a:pPr lvl="1"/>
+            <a:r>
+              <a:rPr lang="en-US" dirty="0"/>
+              <a:t>Reviewing all of the blue, self-check pages at the end of Chapter 9.</a:t>
+            </a:r>
+          </a:p>
+          <a:p>
+            <a:pPr lvl="1"/>
+            <a:r>
+              <a:rPr lang="en-US" dirty="0"/>
+              <a:t>Re-reading sections as needed to complete the self-check problems.</a:t>
+            </a:r>
+          </a:p>
+          <a:p>
+            <a:pPr marL="457200" lvl="1" indent="0">
               <a:buNone/>
             </a:pPr>
             <a:endParaRPr lang="en-US" dirty="0"/>
@@ -32424,7 +32523,7 @@
     </p:spTree>
     <p:extLst>
       <p:ext uri="{BB962C8B-B14F-4D97-AF65-F5344CB8AC3E}">
-        <p14:creationId xmlns:p14="http://schemas.microsoft.com/office/powerpoint/2010/main" val="485091757"/>
+        <p14:creationId xmlns:p14="http://schemas.microsoft.com/office/powerpoint/2010/main" val="3923898911"/>
       </p:ext>
     </p:extLst>
   </p:cSld>
@@ -32468,7 +32567,7 @@
           <a:p>
             <a:r>
               <a:rPr lang="en-US" dirty="0"/>
-              <a:t>Homework</a:t>
+              <a:t>Homework Regrade/Resubmit</a:t>
             </a:r>
           </a:p>
         </p:txBody>
@@ -32488,9 +32587,24 @@
           <a:bodyPr/>
           <a:lstStyle/>
           <a:p>
+            <a:pPr marL="0" indent="0">
+              <a:buNone/>
+            </a:pPr>
             <a:r>
               <a:rPr lang="en-US" dirty="0"/>
-              <a:t>Begin reviewing chapter 9 for the Unit 6 Test.</a:t>
+              <a:t>You all have the opportunity to get full credit  on your homework grades by correcting them now, in class.</a:t>
+            </a:r>
+          </a:p>
+          <a:p>
+            <a:endParaRPr lang="en-US" dirty="0"/>
+          </a:p>
+          <a:p>
+            <a:pPr marL="0" indent="0">
+              <a:buNone/>
+            </a:pPr>
+            <a:r>
+              <a:rPr lang="en-US" dirty="0"/>
+              <a:t>Use your error checking algorithm, and if you need help just ask!</a:t>
             </a:r>
           </a:p>
           <a:p>
@@ -32504,7 +32618,7 @@
     </p:spTree>
     <p:extLst>
       <p:ext uri="{BB962C8B-B14F-4D97-AF65-F5344CB8AC3E}">
-        <p14:creationId xmlns:p14="http://schemas.microsoft.com/office/powerpoint/2010/main" val="912080518"/>
+        <p14:creationId xmlns:p14="http://schemas.microsoft.com/office/powerpoint/2010/main" val="485091757"/>
       </p:ext>
     </p:extLst>
   </p:cSld>
@@ -32538,31 +32652,7 @@
             <a:spLocks noGrp="1"/>
           </p:cNvSpPr>
           <p:nvPr>
-            <p:ph type="ctrTitle"/>
-          </p:nvPr>
-        </p:nvSpPr>
-        <p:spPr/>
-        <p:txBody>
-          <a:bodyPr>
-            <a:normAutofit/>
-          </a:bodyPr>
-          <a:lstStyle/>
-          <a:p>
-            <a:r>
-              <a:rPr lang="en-US" sz="4800" dirty="0"/>
-              <a:t>Review</a:t>
-            </a:r>
-          </a:p>
-        </p:txBody>
-      </p:sp>
-      <p:sp>
-        <p:nvSpPr>
-          <p:cNvPr id="3" name="Subtitle 2"/>
-          <p:cNvSpPr>
-            <a:spLocks noGrp="1"/>
-          </p:cNvSpPr>
-          <p:nvPr>
-            <p:ph type="subTitle" idx="1"/>
+            <p:ph type="title"/>
           </p:nvPr>
         </p:nvSpPr>
         <p:spPr/>
@@ -32572,15 +32662,43 @@
           <a:p>
             <a:r>
               <a:rPr lang="en-US" dirty="0"/>
-              <a:t>[ 6.09 ] [ Today’s Date ] [ Instructor Name ]</a:t>
-            </a:r>
+              <a:t>Homework</a:t>
+            </a:r>
+          </a:p>
+        </p:txBody>
+      </p:sp>
+      <p:sp>
+        <p:nvSpPr>
+          <p:cNvPr id="3" name="Content Placeholder 2"/>
+          <p:cNvSpPr>
+            <a:spLocks noGrp="1"/>
+          </p:cNvSpPr>
+          <p:nvPr>
+            <p:ph idx="1"/>
+          </p:nvPr>
+        </p:nvSpPr>
+        <p:spPr/>
+        <p:txBody>
+          <a:bodyPr/>
+          <a:lstStyle/>
+          <a:p>
+            <a:r>
+              <a:rPr lang="en-US" dirty="0"/>
+              <a:t>Begin reviewing chapter 9 for the Unit 6 Test.</a:t>
+            </a:r>
+          </a:p>
+          <a:p>
+            <a:pPr marL="0" indent="0">
+              <a:buNone/>
+            </a:pPr>
+            <a:endParaRPr lang="en-US" dirty="0"/>
           </a:p>
         </p:txBody>
       </p:sp>
     </p:spTree>
     <p:extLst>
       <p:ext uri="{BB962C8B-B14F-4D97-AF65-F5344CB8AC3E}">
-        <p14:creationId xmlns:p14="http://schemas.microsoft.com/office/powerpoint/2010/main" val="4280762843"/>
+        <p14:creationId xmlns:p14="http://schemas.microsoft.com/office/powerpoint/2010/main" val="912080518"/>
       </p:ext>
     </p:extLst>
   </p:cSld>
@@ -32687,6 +32805,82 @@
       </p:grpSpPr>
       <p:sp>
         <p:nvSpPr>
+          <p:cNvPr id="2" name="Title 1"/>
+          <p:cNvSpPr>
+            <a:spLocks noGrp="1"/>
+          </p:cNvSpPr>
+          <p:nvPr>
+            <p:ph type="ctrTitle"/>
+          </p:nvPr>
+        </p:nvSpPr>
+        <p:spPr/>
+        <p:txBody>
+          <a:bodyPr>
+            <a:normAutofit/>
+          </a:bodyPr>
+          <a:lstStyle/>
+          <a:p>
+            <a:r>
+              <a:rPr lang="en-US" sz="4800" dirty="0"/>
+              <a:t>Review</a:t>
+            </a:r>
+          </a:p>
+        </p:txBody>
+      </p:sp>
+      <p:sp>
+        <p:nvSpPr>
+          <p:cNvPr id="3" name="Subtitle 2"/>
+          <p:cNvSpPr>
+            <a:spLocks noGrp="1"/>
+          </p:cNvSpPr>
+          <p:nvPr>
+            <p:ph type="subTitle" idx="1"/>
+          </p:nvPr>
+        </p:nvSpPr>
+        <p:spPr/>
+        <p:txBody>
+          <a:bodyPr/>
+          <a:lstStyle/>
+          <a:p>
+            <a:r>
+              <a:rPr lang="en-US" dirty="0"/>
+              <a:t>[ 6.09 ] [ Today’s Date ] [ Instructor Name ]</a:t>
+            </a:r>
+          </a:p>
+        </p:txBody>
+      </p:sp>
+    </p:spTree>
+    <p:extLst>
+      <p:ext uri="{BB962C8B-B14F-4D97-AF65-F5344CB8AC3E}">
+        <p14:creationId xmlns:p14="http://schemas.microsoft.com/office/powerpoint/2010/main" val="4280762843"/>
+      </p:ext>
+    </p:extLst>
+  </p:cSld>
+  <p:clrMapOvr>
+    <a:masterClrMapping/>
+  </p:clrMapOvr>
+</p:sld>
+</file>
+
+<file path=ppt/slides/slide91.xml><?xml version="1.0" encoding="utf-8"?>
+<p:sld xmlns:a="http://schemas.openxmlformats.org/drawingml/2006/main" xmlns:r="http://schemas.openxmlformats.org/officeDocument/2006/relationships" xmlns:p="http://schemas.openxmlformats.org/presentationml/2006/main">
+  <p:cSld>
+    <p:spTree>
+      <p:nvGrpSpPr>
+        <p:cNvPr id="1" name=""/>
+        <p:cNvGrpSpPr/>
+        <p:nvPr/>
+      </p:nvGrpSpPr>
+      <p:grpSpPr>
+        <a:xfrm>
+          <a:off x="0" y="0"/>
+          <a:ext cx="0" cy="0"/>
+          <a:chOff x="0" y="0"/>
+          <a:chExt cx="0" cy="0"/>
+        </a:xfrm>
+      </p:grpSpPr>
+      <p:sp>
+        <p:nvSpPr>
           <p:cNvPr id="4" name="Title 3"/>
           <p:cNvSpPr>
             <a:spLocks noGrp="1"/>
@@ -32727,7 +32921,7 @@
 </p:sld>
 </file>
 
-<file path=ppt/slides/slide91.xml><?xml version="1.0" encoding="utf-8"?>
+<file path=ppt/slides/slide92.xml><?xml version="1.0" encoding="utf-8"?>
 <p:sld xmlns:a="http://schemas.openxmlformats.org/drawingml/2006/main" xmlns:r="http://schemas.openxmlformats.org/officeDocument/2006/relationships" xmlns:p="http://schemas.openxmlformats.org/presentationml/2006/main">
   <p:cSld>
     <p:spTree>
@@ -32786,7 +32980,7 @@
 </p:sld>
 </file>
 
-<file path=ppt/slides/slide92.xml><?xml version="1.0" encoding="utf-8"?>
+<file path=ppt/slides/slide93.xml><?xml version="1.0" encoding="utf-8"?>
 <p:sld xmlns:a="http://schemas.openxmlformats.org/drawingml/2006/main" xmlns:r="http://schemas.openxmlformats.org/officeDocument/2006/relationships" xmlns:p="http://schemas.openxmlformats.org/presentationml/2006/main">
   <p:cSld>
     <p:spTree>
@@ -32878,7 +33072,7 @@
 </p:sld>
 </file>
 
-<file path=ppt/slides/slide93.xml><?xml version="1.0" encoding="utf-8"?>
+<file path=ppt/slides/slide94.xml><?xml version="1.0" encoding="utf-8"?>
 <p:sld xmlns:a="http://schemas.openxmlformats.org/drawingml/2006/main" xmlns:r="http://schemas.openxmlformats.org/officeDocument/2006/relationships" xmlns:p="http://schemas.openxmlformats.org/presentationml/2006/main">
   <p:cSld>
     <p:spTree>

</xml_diff>